<commit_message>
updated presentation and added file to check flags
</commit_message>
<xml_diff>
--- a/docs/presentation.pptx
+++ b/docs/presentation.pptx
@@ -12,8 +12,9 @@
     <p:sldId id="264" r:id="rId6"/>
     <p:sldId id="265" r:id="rId7"/>
     <p:sldId id="259" r:id="rId8"/>
-    <p:sldId id="261" r:id="rId9"/>
-    <p:sldId id="260" r:id="rId10"/>
+    <p:sldId id="267" r:id="rId9"/>
+    <p:sldId id="261" r:id="rId10"/>
+    <p:sldId id="260" r:id="rId11"/>
   </p:sldIdLst>
   <p:sldSz cx="12192000" cy="6858000"/>
   <p:notesSz cx="6858000" cy="9144000"/>
@@ -112,6 +113,11 @@
       </a:defRPr>
     </a:lvl9pPr>
   </p:defaultTextStyle>
+  <p:extLst>
+    <p:ext uri="{EFAFB233-063F-42B5-8137-9DF3F51BA10A}">
+      <p15:sldGuideLst xmlns:p15="http://schemas.microsoft.com/office/powerpoint/2012/main"/>
+    </p:ext>
+  </p:extLst>
 </p:presentation>
 </file>
 
@@ -246,7 +252,7 @@
           <a:p>
             <a:fld id="{07B2A7CF-B5D5-CF4E-99F4-5F3633F70EAD}" type="datetimeFigureOut">
               <a:rPr lang="en-US" smtClean="0"/>
-              <a:t>4/28/16</a:t>
+              <a:t>5/2/16</a:t>
             </a:fld>
             <a:endParaRPr lang="en-US"/>
           </a:p>
@@ -416,7 +422,7 @@
           <a:p>
             <a:fld id="{07B2A7CF-B5D5-CF4E-99F4-5F3633F70EAD}" type="datetimeFigureOut">
               <a:rPr lang="en-US" smtClean="0"/>
-              <a:t>4/28/16</a:t>
+              <a:t>5/2/16</a:t>
             </a:fld>
             <a:endParaRPr lang="en-US"/>
           </a:p>
@@ -596,7 +602,7 @@
           <a:p>
             <a:fld id="{07B2A7CF-B5D5-CF4E-99F4-5F3633F70EAD}" type="datetimeFigureOut">
               <a:rPr lang="en-US" smtClean="0"/>
-              <a:t>4/28/16</a:t>
+              <a:t>5/2/16</a:t>
             </a:fld>
             <a:endParaRPr lang="en-US"/>
           </a:p>
@@ -766,7 +772,7 @@
           <a:p>
             <a:fld id="{07B2A7CF-B5D5-CF4E-99F4-5F3633F70EAD}" type="datetimeFigureOut">
               <a:rPr lang="en-US" smtClean="0"/>
-              <a:t>4/28/16</a:t>
+              <a:t>5/2/16</a:t>
             </a:fld>
             <a:endParaRPr lang="en-US"/>
           </a:p>
@@ -1012,7 +1018,7 @@
           <a:p>
             <a:fld id="{07B2A7CF-B5D5-CF4E-99F4-5F3633F70EAD}" type="datetimeFigureOut">
               <a:rPr lang="en-US" smtClean="0"/>
-              <a:t>4/28/16</a:t>
+              <a:t>5/2/16</a:t>
             </a:fld>
             <a:endParaRPr lang="en-US"/>
           </a:p>
@@ -1244,7 +1250,7 @@
           <a:p>
             <a:fld id="{07B2A7CF-B5D5-CF4E-99F4-5F3633F70EAD}" type="datetimeFigureOut">
               <a:rPr lang="en-US" smtClean="0"/>
-              <a:t>4/28/16</a:t>
+              <a:t>5/2/16</a:t>
             </a:fld>
             <a:endParaRPr lang="en-US"/>
           </a:p>
@@ -1611,7 +1617,7 @@
           <a:p>
             <a:fld id="{07B2A7CF-B5D5-CF4E-99F4-5F3633F70EAD}" type="datetimeFigureOut">
               <a:rPr lang="en-US" smtClean="0"/>
-              <a:t>4/28/16</a:t>
+              <a:t>5/2/16</a:t>
             </a:fld>
             <a:endParaRPr lang="en-US"/>
           </a:p>
@@ -1729,7 +1735,7 @@
           <a:p>
             <a:fld id="{07B2A7CF-B5D5-CF4E-99F4-5F3633F70EAD}" type="datetimeFigureOut">
               <a:rPr lang="en-US" smtClean="0"/>
-              <a:t>4/28/16</a:t>
+              <a:t>5/2/16</a:t>
             </a:fld>
             <a:endParaRPr lang="en-US"/>
           </a:p>
@@ -1824,7 +1830,7 @@
           <a:p>
             <a:fld id="{07B2A7CF-B5D5-CF4E-99F4-5F3633F70EAD}" type="datetimeFigureOut">
               <a:rPr lang="en-US" smtClean="0"/>
-              <a:t>4/28/16</a:t>
+              <a:t>5/2/16</a:t>
             </a:fld>
             <a:endParaRPr lang="en-US"/>
           </a:p>
@@ -2101,7 +2107,7 @@
           <a:p>
             <a:fld id="{07B2A7CF-B5D5-CF4E-99F4-5F3633F70EAD}" type="datetimeFigureOut">
               <a:rPr lang="en-US" smtClean="0"/>
-              <a:t>4/28/16</a:t>
+              <a:t>5/2/16</a:t>
             </a:fld>
             <a:endParaRPr lang="en-US"/>
           </a:p>
@@ -2354,7 +2360,7 @@
           <a:p>
             <a:fld id="{07B2A7CF-B5D5-CF4E-99F4-5F3633F70EAD}" type="datetimeFigureOut">
               <a:rPr lang="en-US" smtClean="0"/>
-              <a:t>4/28/16</a:t>
+              <a:t>5/2/16</a:t>
             </a:fld>
             <a:endParaRPr lang="en-US"/>
           </a:p>
@@ -2567,7 +2573,7 @@
           <a:p>
             <a:fld id="{07B2A7CF-B5D5-CF4E-99F4-5F3633F70EAD}" type="datetimeFigureOut">
               <a:rPr lang="en-US" smtClean="0"/>
-              <a:t>4/28/16</a:t>
+              <a:t>5/2/16</a:t>
             </a:fld>
             <a:endParaRPr lang="en-US"/>
           </a:p>
@@ -3036,6 +3042,102 @@
   <p:clrMapOvr>
     <a:masterClrMapping/>
   </p:clrMapOvr>
+  <p:timing>
+    <p:tnLst>
+      <p:par>
+        <p:cTn id="1" dur="indefinite" restart="never" nodeType="tmRoot"/>
+      </p:par>
+    </p:tnLst>
+  </p:timing>
+</p:sld>
+</file>
+
+<file path=ppt/slides/slide10.xml><?xml version="1.0" encoding="utf-8"?>
+<p:sld xmlns:a="http://schemas.openxmlformats.org/drawingml/2006/main" xmlns:r="http://schemas.openxmlformats.org/officeDocument/2006/relationships" xmlns:p="http://schemas.openxmlformats.org/presentationml/2006/main">
+  <p:cSld>
+    <p:spTree>
+      <p:nvGrpSpPr>
+        <p:cNvPr id="1" name=""/>
+        <p:cNvGrpSpPr/>
+        <p:nvPr/>
+      </p:nvGrpSpPr>
+      <p:grpSpPr>
+        <a:xfrm>
+          <a:off x="0" y="0"/>
+          <a:ext cx="0" cy="0"/>
+          <a:chOff x="0" y="0"/>
+          <a:chExt cx="0" cy="0"/>
+        </a:xfrm>
+      </p:grpSpPr>
+      <p:sp>
+        <p:nvSpPr>
+          <p:cNvPr id="2" name="Title 1"/>
+          <p:cNvSpPr>
+            <a:spLocks noGrp="1"/>
+          </p:cNvSpPr>
+          <p:nvPr>
+            <p:ph type="title"/>
+          </p:nvPr>
+        </p:nvSpPr>
+        <p:spPr/>
+        <p:txBody>
+          <a:bodyPr/>
+          <a:lstStyle/>
+          <a:p>
+            <a:r>
+              <a:rPr lang="en-US" dirty="0" smtClean="0"/>
+              <a:t>Results and BER</a:t>
+            </a:r>
+            <a:endParaRPr lang="en-US" dirty="0"/>
+          </a:p>
+        </p:txBody>
+      </p:sp>
+      <p:sp>
+        <p:nvSpPr>
+          <p:cNvPr id="3" name="Content Placeholder 2"/>
+          <p:cNvSpPr>
+            <a:spLocks noGrp="1"/>
+          </p:cNvSpPr>
+          <p:nvPr>
+            <p:ph idx="1"/>
+          </p:nvPr>
+        </p:nvSpPr>
+        <p:spPr/>
+        <p:txBody>
+          <a:bodyPr/>
+          <a:lstStyle/>
+          <a:p>
+            <a:r>
+              <a:rPr lang="en-US" dirty="0" smtClean="0"/>
+              <a:t>We’ve doubled the baud rate and thus the amount of bits we can send in the time period</a:t>
+            </a:r>
+          </a:p>
+          <a:p>
+            <a:r>
+              <a:rPr lang="en-US" dirty="0" smtClean="0"/>
+              <a:t>However, how much more likely is it for the transmission to fail and how does this affect our entire system?</a:t>
+            </a:r>
+            <a:endParaRPr lang="en-US" dirty="0"/>
+          </a:p>
+        </p:txBody>
+      </p:sp>
+    </p:spTree>
+    <p:extLst>
+      <p:ext uri="{BB962C8B-B14F-4D97-AF65-F5344CB8AC3E}">
+        <p14:creationId xmlns:p14="http://schemas.microsoft.com/office/powerpoint/2010/main" val="320723473"/>
+      </p:ext>
+    </p:extLst>
+  </p:cSld>
+  <p:clrMapOvr>
+    <a:masterClrMapping/>
+  </p:clrMapOvr>
+  <p:timing>
+    <p:tnLst>
+      <p:par>
+        <p:cTn id="1" dur="indefinite" restart="never" nodeType="tmRoot"/>
+      </p:par>
+    </p:tnLst>
+  </p:timing>
 </p:sld>
 </file>
 
@@ -3269,6 +3371,13 @@
   <p:clrMapOvr>
     <a:masterClrMapping/>
   </p:clrMapOvr>
+  <p:timing>
+    <p:tnLst>
+      <p:par>
+        <p:cTn id="1" dur="indefinite" restart="never" nodeType="tmRoot"/>
+      </p:par>
+    </p:tnLst>
+  </p:timing>
 </p:sld>
 </file>
 
@@ -3324,20 +3433,22 @@
         </p:nvSpPr>
         <p:spPr>
           <a:xfrm>
-            <a:off x="5245100" y="1454150"/>
-            <a:ext cx="1473200" cy="498475"/>
+            <a:off x="5080000" y="1606550"/>
+            <a:ext cx="1968500" cy="498475"/>
           </a:xfrm>
         </p:spPr>
         <p:txBody>
-          <a:bodyPr/>
+          <a:bodyPr>
+            <a:normAutofit fontScale="70000" lnSpcReduction="20000"/>
+          </a:bodyPr>
           <a:lstStyle/>
           <a:p>
             <a:pPr marL="0" indent="0">
               <a:buNone/>
             </a:pPr>
             <a:r>
-              <a:rPr lang="en-US" dirty="0" smtClean="0"/>
-              <a:t>Original</a:t>
+              <a:rPr lang="en-US" smtClean="0"/>
+              <a:t>Original – 1.5MB</a:t>
             </a:r>
             <a:endParaRPr lang="en-US" dirty="0"/>
           </a:p>
@@ -3367,9 +3478,594 @@
           </a:prstGeom>
         </p:spPr>
       </p:pic>
-      <p:sp>
-        <p:nvSpPr>
-          <p:cNvPr id="6" name="Content Placeholder 2"/>
+      <p:pic>
+        <p:nvPicPr>
+          <p:cNvPr id="9" name="Picture 8"/>
+          <p:cNvPicPr>
+            <a:picLocks noChangeAspect="1"/>
+          </p:cNvPicPr>
+          <p:nvPr/>
+        </p:nvPicPr>
+        <p:blipFill>
+          <a:blip r:embed="rId3"/>
+          <a:stretch>
+            <a:fillRect/>
+          </a:stretch>
+        </p:blipFill>
+        <p:spPr>
+          <a:xfrm>
+            <a:off x="393700" y="4066948"/>
+            <a:ext cx="3683000" cy="1551214"/>
+          </a:xfrm>
+          <a:prstGeom prst="rect">
+            <a:avLst/>
+          </a:prstGeom>
+        </p:spPr>
+      </p:pic>
+      <p:pic>
+        <p:nvPicPr>
+          <p:cNvPr id="13" name="Picture 12"/>
+          <p:cNvPicPr>
+            <a:picLocks noChangeAspect="1"/>
+          </p:cNvPicPr>
+          <p:nvPr/>
+        </p:nvPicPr>
+        <p:blipFill>
+          <a:blip r:embed="rId4"/>
+          <a:stretch>
+            <a:fillRect/>
+          </a:stretch>
+        </p:blipFill>
+        <p:spPr>
+          <a:xfrm>
+            <a:off x="4076700" y="4079648"/>
+            <a:ext cx="3567792" cy="1551214"/>
+          </a:xfrm>
+          <a:prstGeom prst="rect">
+            <a:avLst/>
+          </a:prstGeom>
+        </p:spPr>
+      </p:pic>
+      <p:pic>
+        <p:nvPicPr>
+          <p:cNvPr id="14" name="Picture 13"/>
+          <p:cNvPicPr>
+            <a:picLocks noChangeAspect="1"/>
+          </p:cNvPicPr>
+          <p:nvPr/>
+        </p:nvPicPr>
+        <p:blipFill>
+          <a:blip r:embed="rId5"/>
+          <a:stretch>
+            <a:fillRect/>
+          </a:stretch>
+        </p:blipFill>
+        <p:spPr>
+          <a:xfrm>
+            <a:off x="7937500" y="4112979"/>
+            <a:ext cx="3569416" cy="1479783"/>
+          </a:xfrm>
+          <a:prstGeom prst="rect">
+            <a:avLst/>
+          </a:prstGeom>
+        </p:spPr>
+      </p:pic>
+      <p:sp>
+        <p:nvSpPr>
+          <p:cNvPr id="15" name="TextBox 14"/>
+          <p:cNvSpPr txBox="1"/>
+          <p:nvPr/>
+        </p:nvSpPr>
+        <p:spPr>
+          <a:xfrm>
+            <a:off x="1612900" y="5613400"/>
+            <a:ext cx="2133600" cy="646331"/>
+          </a:xfrm>
+          <a:prstGeom prst="rect">
+            <a:avLst/>
+          </a:prstGeom>
+          <a:noFill/>
+        </p:spPr>
+        <p:txBody>
+          <a:bodyPr wrap="square" rtlCol="0">
+            <a:spAutoFit/>
+          </a:bodyPr>
+          <a:lstStyle/>
+          <a:p>
+            <a:r>
+              <a:rPr lang="en-US" dirty="0" smtClean="0"/>
+              <a:t>PSNR = 11.13</a:t>
+            </a:r>
+          </a:p>
+          <a:p>
+            <a:r>
+              <a:rPr lang="en-US" dirty="0" smtClean="0"/>
+              <a:t>Size = 3kB</a:t>
+            </a:r>
+            <a:endParaRPr lang="en-US" dirty="0"/>
+          </a:p>
+        </p:txBody>
+      </p:sp>
+      <p:sp>
+        <p:nvSpPr>
+          <p:cNvPr id="16" name="TextBox 15"/>
+          <p:cNvSpPr txBox="1"/>
+          <p:nvPr/>
+        </p:nvSpPr>
+        <p:spPr>
+          <a:xfrm>
+            <a:off x="5321300" y="5626100"/>
+            <a:ext cx="2133600" cy="646331"/>
+          </a:xfrm>
+          <a:prstGeom prst="rect">
+            <a:avLst/>
+          </a:prstGeom>
+          <a:noFill/>
+        </p:spPr>
+        <p:txBody>
+          <a:bodyPr wrap="square" rtlCol="0">
+            <a:spAutoFit/>
+          </a:bodyPr>
+          <a:lstStyle/>
+          <a:p>
+            <a:r>
+              <a:rPr lang="en-US" dirty="0" smtClean="0"/>
+              <a:t>PSNR = 24.01</a:t>
+            </a:r>
+          </a:p>
+          <a:p>
+            <a:r>
+              <a:rPr lang="en-US" dirty="0" smtClean="0"/>
+              <a:t>Size = 15kB</a:t>
+            </a:r>
+            <a:endParaRPr lang="en-US" dirty="0"/>
+          </a:p>
+        </p:txBody>
+      </p:sp>
+      <p:sp>
+        <p:nvSpPr>
+          <p:cNvPr id="17" name="TextBox 16"/>
+          <p:cNvSpPr txBox="1"/>
+          <p:nvPr/>
+        </p:nvSpPr>
+        <p:spPr>
+          <a:xfrm>
+            <a:off x="9093200" y="5632216"/>
+            <a:ext cx="2133600" cy="646331"/>
+          </a:xfrm>
+          <a:prstGeom prst="rect">
+            <a:avLst/>
+          </a:prstGeom>
+          <a:noFill/>
+        </p:spPr>
+        <p:txBody>
+          <a:bodyPr wrap="square" rtlCol="0">
+            <a:spAutoFit/>
+          </a:bodyPr>
+          <a:lstStyle/>
+          <a:p>
+            <a:r>
+              <a:rPr lang="en-US" dirty="0" smtClean="0"/>
+              <a:t>PSNR = 30.36</a:t>
+            </a:r>
+          </a:p>
+          <a:p>
+            <a:r>
+              <a:rPr lang="en-US" dirty="0" smtClean="0"/>
+              <a:t>Size = 65kB</a:t>
+            </a:r>
+            <a:endParaRPr lang="en-US" dirty="0"/>
+          </a:p>
+        </p:txBody>
+      </p:sp>
+    </p:spTree>
+    <p:extLst>
+      <p:ext uri="{BB962C8B-B14F-4D97-AF65-F5344CB8AC3E}">
+        <p14:creationId xmlns:p14="http://schemas.microsoft.com/office/powerpoint/2010/main" val="1845289850"/>
+      </p:ext>
+    </p:extLst>
+  </p:cSld>
+  <p:clrMapOvr>
+    <a:masterClrMapping/>
+  </p:clrMapOvr>
+  <p:timing>
+    <p:tnLst>
+      <p:par>
+        <p:cTn id="1" dur="indefinite" restart="never" nodeType="tmRoot"/>
+      </p:par>
+    </p:tnLst>
+  </p:timing>
+</p:sld>
+</file>
+
+<file path=ppt/slides/slide4.xml><?xml version="1.0" encoding="utf-8"?>
+<p:sld xmlns:a="http://schemas.openxmlformats.org/drawingml/2006/main" xmlns:r="http://schemas.openxmlformats.org/officeDocument/2006/relationships" xmlns:p="http://schemas.openxmlformats.org/presentationml/2006/main">
+  <p:cSld>
+    <p:spTree>
+      <p:nvGrpSpPr>
+        <p:cNvPr id="1" name=""/>
+        <p:cNvGrpSpPr/>
+        <p:nvPr/>
+      </p:nvGrpSpPr>
+      <p:grpSpPr>
+        <a:xfrm>
+          <a:off x="0" y="0"/>
+          <a:ext cx="0" cy="0"/>
+          <a:chOff x="0" y="0"/>
+          <a:chExt cx="0" cy="0"/>
+        </a:xfrm>
+      </p:grpSpPr>
+      <p:sp>
+        <p:nvSpPr>
+          <p:cNvPr id="2" name="Title 1"/>
+          <p:cNvSpPr>
+            <a:spLocks noGrp="1"/>
+          </p:cNvSpPr>
+          <p:nvPr>
+            <p:ph type="title"/>
+          </p:nvPr>
+        </p:nvSpPr>
+        <p:spPr/>
+        <p:txBody>
+          <a:bodyPr/>
+          <a:lstStyle/>
+          <a:p>
+            <a:r>
+              <a:rPr lang="en-US" dirty="0" smtClean="0"/>
+              <a:t>Lossless Compression</a:t>
+            </a:r>
+            <a:endParaRPr lang="en-US" dirty="0"/>
+          </a:p>
+        </p:txBody>
+      </p:sp>
+      <p:sp>
+        <p:nvSpPr>
+          <p:cNvPr id="3" name="Content Placeholder 2"/>
+          <p:cNvSpPr>
+            <a:spLocks noGrp="1"/>
+          </p:cNvSpPr>
+          <p:nvPr>
+            <p:ph idx="1"/>
+          </p:nvPr>
+        </p:nvSpPr>
+        <p:spPr/>
+        <p:txBody>
+          <a:bodyPr/>
+          <a:lstStyle/>
+          <a:p>
+            <a:r>
+              <a:rPr lang="en-US" dirty="0" err="1" smtClean="0"/>
+              <a:t>Gzip</a:t>
+            </a:r>
+            <a:endParaRPr lang="en-US" dirty="0"/>
+          </a:p>
+        </p:txBody>
+      </p:sp>
+    </p:spTree>
+    <p:extLst>
+      <p:ext uri="{BB962C8B-B14F-4D97-AF65-F5344CB8AC3E}">
+        <p14:creationId xmlns:p14="http://schemas.microsoft.com/office/powerpoint/2010/main" val="1005653086"/>
+      </p:ext>
+    </p:extLst>
+  </p:cSld>
+  <p:clrMapOvr>
+    <a:masterClrMapping/>
+  </p:clrMapOvr>
+  <p:timing>
+    <p:tnLst>
+      <p:par>
+        <p:cTn id="1" dur="indefinite" restart="never" nodeType="tmRoot"/>
+      </p:par>
+    </p:tnLst>
+  </p:timing>
+</p:sld>
+</file>
+
+<file path=ppt/slides/slide5.xml><?xml version="1.0" encoding="utf-8"?>
+<p:sld xmlns:a="http://schemas.openxmlformats.org/drawingml/2006/main" xmlns:r="http://schemas.openxmlformats.org/officeDocument/2006/relationships" xmlns:p="http://schemas.openxmlformats.org/presentationml/2006/main">
+  <p:cSld>
+    <p:spTree>
+      <p:nvGrpSpPr>
+        <p:cNvPr id="1" name=""/>
+        <p:cNvGrpSpPr/>
+        <p:nvPr/>
+      </p:nvGrpSpPr>
+      <p:grpSpPr>
+        <a:xfrm>
+          <a:off x="0" y="0"/>
+          <a:ext cx="0" cy="0"/>
+          <a:chOff x="0" y="0"/>
+          <a:chExt cx="0" cy="0"/>
+        </a:xfrm>
+      </p:grpSpPr>
+      <p:sp>
+        <p:nvSpPr>
+          <p:cNvPr id="2" name="Title 1"/>
+          <p:cNvSpPr>
+            <a:spLocks noGrp="1"/>
+          </p:cNvSpPr>
+          <p:nvPr>
+            <p:ph type="title"/>
+          </p:nvPr>
+        </p:nvSpPr>
+        <p:spPr/>
+        <p:txBody>
+          <a:bodyPr/>
+          <a:lstStyle/>
+          <a:p>
+            <a:r>
+              <a:rPr lang="en-US" dirty="0" smtClean="0"/>
+              <a:t>Packets</a:t>
+            </a:r>
+            <a:endParaRPr lang="en-US" dirty="0"/>
+          </a:p>
+        </p:txBody>
+      </p:sp>
+      <p:sp>
+        <p:nvSpPr>
+          <p:cNvPr id="3" name="Content Placeholder 2"/>
+          <p:cNvSpPr>
+            <a:spLocks noGrp="1"/>
+          </p:cNvSpPr>
+          <p:nvPr>
+            <p:ph idx="1"/>
+          </p:nvPr>
+        </p:nvSpPr>
+        <p:spPr/>
+        <p:txBody>
+          <a:bodyPr/>
+          <a:lstStyle/>
+          <a:p>
+            <a:endParaRPr lang="en-US"/>
+          </a:p>
+        </p:txBody>
+      </p:sp>
+    </p:spTree>
+    <p:extLst>
+      <p:ext uri="{BB962C8B-B14F-4D97-AF65-F5344CB8AC3E}">
+        <p14:creationId xmlns:p14="http://schemas.microsoft.com/office/powerpoint/2010/main" val="1453757304"/>
+      </p:ext>
+    </p:extLst>
+  </p:cSld>
+  <p:clrMapOvr>
+    <a:masterClrMapping/>
+  </p:clrMapOvr>
+  <p:timing>
+    <p:tnLst>
+      <p:par>
+        <p:cTn id="1" dur="indefinite" restart="never" nodeType="tmRoot"/>
+      </p:par>
+    </p:tnLst>
+  </p:timing>
+</p:sld>
+</file>
+
+<file path=ppt/slides/slide6.xml><?xml version="1.0" encoding="utf-8"?>
+<p:sld xmlns:a="http://schemas.openxmlformats.org/drawingml/2006/main" xmlns:r="http://schemas.openxmlformats.org/officeDocument/2006/relationships" xmlns:p="http://schemas.openxmlformats.org/presentationml/2006/main">
+  <p:cSld>
+    <p:spTree>
+      <p:nvGrpSpPr>
+        <p:cNvPr id="1" name=""/>
+        <p:cNvGrpSpPr/>
+        <p:nvPr/>
+      </p:nvGrpSpPr>
+      <p:grpSpPr>
+        <a:xfrm>
+          <a:off x="0" y="0"/>
+          <a:ext cx="0" cy="0"/>
+          <a:chOff x="0" y="0"/>
+          <a:chExt cx="0" cy="0"/>
+        </a:xfrm>
+      </p:grpSpPr>
+      <p:sp>
+        <p:nvSpPr>
+          <p:cNvPr id="2" name="Title 1"/>
+          <p:cNvSpPr>
+            <a:spLocks noGrp="1"/>
+          </p:cNvSpPr>
+          <p:nvPr>
+            <p:ph type="title"/>
+          </p:nvPr>
+        </p:nvSpPr>
+        <p:spPr/>
+        <p:txBody>
+          <a:bodyPr/>
+          <a:lstStyle/>
+          <a:p>
+            <a:r>
+              <a:rPr lang="en-US" dirty="0" smtClean="0"/>
+              <a:t>Network</a:t>
+            </a:r>
+            <a:endParaRPr lang="en-US" dirty="0"/>
+          </a:p>
+        </p:txBody>
+      </p:sp>
+      <p:sp>
+        <p:nvSpPr>
+          <p:cNvPr id="3" name="Content Placeholder 2"/>
+          <p:cNvSpPr>
+            <a:spLocks noGrp="1"/>
+          </p:cNvSpPr>
+          <p:nvPr>
+            <p:ph idx="1"/>
+          </p:nvPr>
+        </p:nvSpPr>
+        <p:spPr/>
+        <p:txBody>
+          <a:bodyPr/>
+          <a:lstStyle/>
+          <a:p>
+            <a:endParaRPr lang="en-US"/>
+          </a:p>
+        </p:txBody>
+      </p:sp>
+    </p:spTree>
+    <p:extLst>
+      <p:ext uri="{BB962C8B-B14F-4D97-AF65-F5344CB8AC3E}">
+        <p14:creationId xmlns:p14="http://schemas.microsoft.com/office/powerpoint/2010/main" val="1215310775"/>
+      </p:ext>
+    </p:extLst>
+  </p:cSld>
+  <p:clrMapOvr>
+    <a:masterClrMapping/>
+  </p:clrMapOvr>
+  <p:timing>
+    <p:tnLst>
+      <p:par>
+        <p:cTn id="1" dur="indefinite" restart="never" nodeType="tmRoot"/>
+      </p:par>
+    </p:tnLst>
+  </p:timing>
+</p:sld>
+</file>
+
+<file path=ppt/slides/slide7.xml><?xml version="1.0" encoding="utf-8"?>
+<p:sld xmlns:a="http://schemas.openxmlformats.org/drawingml/2006/main" xmlns:r="http://schemas.openxmlformats.org/officeDocument/2006/relationships" xmlns:p="http://schemas.openxmlformats.org/presentationml/2006/main">
+  <p:cSld>
+    <p:spTree>
+      <p:nvGrpSpPr>
+        <p:cNvPr id="1" name=""/>
+        <p:cNvGrpSpPr/>
+        <p:nvPr/>
+      </p:nvGrpSpPr>
+      <p:grpSpPr>
+        <a:xfrm>
+          <a:off x="0" y="0"/>
+          <a:ext cx="0" cy="0"/>
+          <a:chOff x="0" y="0"/>
+          <a:chExt cx="0" cy="0"/>
+        </a:xfrm>
+      </p:grpSpPr>
+      <p:sp>
+        <p:nvSpPr>
+          <p:cNvPr id="2" name="Title 1"/>
+          <p:cNvSpPr>
+            <a:spLocks noGrp="1"/>
+          </p:cNvSpPr>
+          <p:nvPr>
+            <p:ph type="title"/>
+          </p:nvPr>
+        </p:nvSpPr>
+        <p:spPr/>
+        <p:txBody>
+          <a:bodyPr/>
+          <a:lstStyle/>
+          <a:p>
+            <a:r>
+              <a:rPr lang="en-US" dirty="0" smtClean="0"/>
+              <a:t>Physical Layer</a:t>
+            </a:r>
+            <a:endParaRPr lang="en-US" dirty="0"/>
+          </a:p>
+        </p:txBody>
+      </p:sp>
+      <p:sp>
+        <p:nvSpPr>
+          <p:cNvPr id="3" name="Content Placeholder 2"/>
+          <p:cNvSpPr>
+            <a:spLocks noGrp="1"/>
+          </p:cNvSpPr>
+          <p:nvPr>
+            <p:ph idx="1"/>
+          </p:nvPr>
+        </p:nvSpPr>
+        <p:spPr>
+          <a:xfrm>
+            <a:off x="838200" y="1825625"/>
+            <a:ext cx="5499100" cy="4351338"/>
+          </a:xfrm>
+        </p:spPr>
+        <p:txBody>
+          <a:bodyPr>
+            <a:normAutofit fontScale="92500" lnSpcReduction="10000"/>
+          </a:bodyPr>
+          <a:lstStyle/>
+          <a:p>
+            <a:r>
+              <a:rPr lang="en-US" dirty="0" smtClean="0"/>
+              <a:t>Looked into Multiple Frequency Shift Keying (MFSK)</a:t>
+            </a:r>
+          </a:p>
+          <a:p>
+            <a:r>
+              <a:rPr lang="en-US" dirty="0" smtClean="0"/>
+              <a:t>Went with </a:t>
+            </a:r>
+            <a:r>
+              <a:rPr lang="en-US" b="1" dirty="0" smtClean="0"/>
+              <a:t>Minimum Shift Keying (MSK) </a:t>
+            </a:r>
+            <a:r>
+              <a:rPr lang="en-US" dirty="0" smtClean="0"/>
+              <a:t>for simplicity</a:t>
+            </a:r>
+          </a:p>
+          <a:p>
+            <a:r>
+              <a:rPr lang="en-US" dirty="0" smtClean="0"/>
+              <a:t>FM Bandwidth is only 3kHz</a:t>
+            </a:r>
+          </a:p>
+          <a:p>
+            <a:r>
+              <a:rPr lang="en-US" dirty="0" smtClean="0"/>
+              <a:t>Went with </a:t>
+            </a:r>
+            <a:r>
+              <a:rPr lang="en-US" dirty="0" err="1" smtClean="0"/>
+              <a:t>mark_f</a:t>
+            </a:r>
+            <a:r>
+              <a:rPr lang="en-US" dirty="0" smtClean="0"/>
+              <a:t> = 1200 HZ, </a:t>
+            </a:r>
+            <a:r>
+              <a:rPr lang="en-US" dirty="0" err="1" smtClean="0"/>
+              <a:t>space_f</a:t>
+            </a:r>
+            <a:r>
+              <a:rPr lang="en-US" dirty="0" smtClean="0"/>
+              <a:t> = 2400 Hz and baud rate = 2400</a:t>
+            </a:r>
+          </a:p>
+          <a:p>
+            <a:r>
+              <a:rPr lang="en-US" dirty="0" smtClean="0"/>
+              <a:t>Each bit encoded as half sinusoid (mark) or full sinusoid (space) as a result of having the mark and space frequencies divide the baud rate</a:t>
+            </a:r>
+          </a:p>
+          <a:p>
+            <a:endParaRPr lang="en-US" dirty="0" smtClean="0"/>
+          </a:p>
+        </p:txBody>
+      </p:sp>
+      <p:pic>
+        <p:nvPicPr>
+          <p:cNvPr id="4" name="Picture 3"/>
+          <p:cNvPicPr>
+            <a:picLocks noChangeAspect="1"/>
+          </p:cNvPicPr>
+          <p:nvPr/>
+        </p:nvPicPr>
+        <p:blipFill>
+          <a:blip r:embed="rId2"/>
+          <a:stretch>
+            <a:fillRect/>
+          </a:stretch>
+        </p:blipFill>
+        <p:spPr>
+          <a:xfrm>
+            <a:off x="6692900" y="1690688"/>
+            <a:ext cx="4927600" cy="3289300"/>
+          </a:xfrm>
+          <a:prstGeom prst="rect">
+            <a:avLst/>
+          </a:prstGeom>
+        </p:spPr>
+      </p:pic>
+      <p:sp>
+        <p:nvSpPr>
+          <p:cNvPr id="5" name="Content Placeholder 2"/>
           <p:cNvSpPr txBox="1">
             <a:spLocks/>
           </p:cNvSpPr>
@@ -3377,8 +4073,8 @@
         </p:nvSpPr>
         <p:spPr>
           <a:xfrm>
-            <a:off x="1600200" y="3946524"/>
-            <a:ext cx="1473200" cy="498475"/>
+            <a:off x="6692900" y="4979988"/>
+            <a:ext cx="5499100" cy="4351338"/>
           </a:xfrm>
           <a:prstGeom prst="rect">
             <a:avLst/>
@@ -3554,1057 +4250,6 @@
           </a:lstStyle>
           <a:p>
             <a:pPr marL="0" indent="0">
-              <a:buFont typeface="Arial"/>
-              <a:buNone/>
-            </a:pPr>
-            <a:r>
-              <a:rPr lang="en-US"/>
-              <a:t>q</a:t>
-            </a:r>
-            <a:r>
-              <a:rPr lang="en-US" smtClean="0"/>
-              <a:t>=10</a:t>
-            </a:r>
-            <a:endParaRPr lang="en-US" dirty="0"/>
-          </a:p>
-        </p:txBody>
-      </p:sp>
-      <p:sp>
-        <p:nvSpPr>
-          <p:cNvPr id="7" name="Content Placeholder 2"/>
-          <p:cNvSpPr txBox="1">
-            <a:spLocks/>
-          </p:cNvSpPr>
-          <p:nvPr/>
-        </p:nvSpPr>
-        <p:spPr>
-          <a:xfrm>
-            <a:off x="5359400" y="3959225"/>
-            <a:ext cx="1473200" cy="498475"/>
-          </a:xfrm>
-          <a:prstGeom prst="rect">
-            <a:avLst/>
-          </a:prstGeom>
-        </p:spPr>
-        <p:txBody>
-          <a:bodyPr vert="horz" lIns="91440" tIns="45720" rIns="91440" bIns="45720" rtlCol="0">
-            <a:normAutofit/>
-          </a:bodyPr>
-          <a:lstStyle>
-            <a:lvl1pPr marL="228600" indent="-228600" algn="l" defTabSz="914400" rtl="0" eaLnBrk="1" latinLnBrk="0" hangingPunct="1">
-              <a:lnSpc>
-                <a:spcPct val="90000"/>
-              </a:lnSpc>
-              <a:spcBef>
-                <a:spcPts val="1000"/>
-              </a:spcBef>
-              <a:buFont typeface="Arial"/>
-              <a:buChar char="•"/>
-              <a:defRPr sz="2800" kern="1200">
-                <a:solidFill>
-                  <a:schemeClr val="tx1"/>
-                </a:solidFill>
-                <a:latin typeface="+mn-lt"/>
-                <a:ea typeface="+mn-ea"/>
-                <a:cs typeface="+mn-cs"/>
-              </a:defRPr>
-            </a:lvl1pPr>
-            <a:lvl2pPr marL="685800" indent="-228600" algn="l" defTabSz="914400" rtl="0" eaLnBrk="1" latinLnBrk="0" hangingPunct="1">
-              <a:lnSpc>
-                <a:spcPct val="90000"/>
-              </a:lnSpc>
-              <a:spcBef>
-                <a:spcPts val="500"/>
-              </a:spcBef>
-              <a:buFont typeface="Arial"/>
-              <a:buChar char="•"/>
-              <a:defRPr sz="2400" kern="1200">
-                <a:solidFill>
-                  <a:schemeClr val="tx1"/>
-                </a:solidFill>
-                <a:latin typeface="+mn-lt"/>
-                <a:ea typeface="+mn-ea"/>
-                <a:cs typeface="+mn-cs"/>
-              </a:defRPr>
-            </a:lvl2pPr>
-            <a:lvl3pPr marL="1143000" indent="-228600" algn="l" defTabSz="914400" rtl="0" eaLnBrk="1" latinLnBrk="0" hangingPunct="1">
-              <a:lnSpc>
-                <a:spcPct val="90000"/>
-              </a:lnSpc>
-              <a:spcBef>
-                <a:spcPts val="500"/>
-              </a:spcBef>
-              <a:buFont typeface="Arial"/>
-              <a:buChar char="•"/>
-              <a:defRPr sz="2000" kern="1200">
-                <a:solidFill>
-                  <a:schemeClr val="tx1"/>
-                </a:solidFill>
-                <a:latin typeface="+mn-lt"/>
-                <a:ea typeface="+mn-ea"/>
-                <a:cs typeface="+mn-cs"/>
-              </a:defRPr>
-            </a:lvl3pPr>
-            <a:lvl4pPr marL="1600200" indent="-228600" algn="l" defTabSz="914400" rtl="0" eaLnBrk="1" latinLnBrk="0" hangingPunct="1">
-              <a:lnSpc>
-                <a:spcPct val="90000"/>
-              </a:lnSpc>
-              <a:spcBef>
-                <a:spcPts val="500"/>
-              </a:spcBef>
-              <a:buFont typeface="Arial"/>
-              <a:buChar char="•"/>
-              <a:defRPr sz="1800" kern="1200">
-                <a:solidFill>
-                  <a:schemeClr val="tx1"/>
-                </a:solidFill>
-                <a:latin typeface="+mn-lt"/>
-                <a:ea typeface="+mn-ea"/>
-                <a:cs typeface="+mn-cs"/>
-              </a:defRPr>
-            </a:lvl4pPr>
-            <a:lvl5pPr marL="2057400" indent="-228600" algn="l" defTabSz="914400" rtl="0" eaLnBrk="1" latinLnBrk="0" hangingPunct="1">
-              <a:lnSpc>
-                <a:spcPct val="90000"/>
-              </a:lnSpc>
-              <a:spcBef>
-                <a:spcPts val="500"/>
-              </a:spcBef>
-              <a:buFont typeface="Arial"/>
-              <a:buChar char="•"/>
-              <a:defRPr sz="1800" kern="1200">
-                <a:solidFill>
-                  <a:schemeClr val="tx1"/>
-                </a:solidFill>
-                <a:latin typeface="+mn-lt"/>
-                <a:ea typeface="+mn-ea"/>
-                <a:cs typeface="+mn-cs"/>
-              </a:defRPr>
-            </a:lvl5pPr>
-            <a:lvl6pPr marL="2514600" indent="-228600" algn="l" defTabSz="914400" rtl="0" eaLnBrk="1" latinLnBrk="0" hangingPunct="1">
-              <a:lnSpc>
-                <a:spcPct val="90000"/>
-              </a:lnSpc>
-              <a:spcBef>
-                <a:spcPts val="500"/>
-              </a:spcBef>
-              <a:buFont typeface="Arial"/>
-              <a:buChar char="•"/>
-              <a:defRPr sz="1800" kern="1200">
-                <a:solidFill>
-                  <a:schemeClr val="tx1"/>
-                </a:solidFill>
-                <a:latin typeface="+mn-lt"/>
-                <a:ea typeface="+mn-ea"/>
-                <a:cs typeface="+mn-cs"/>
-              </a:defRPr>
-            </a:lvl6pPr>
-            <a:lvl7pPr marL="2971800" indent="-228600" algn="l" defTabSz="914400" rtl="0" eaLnBrk="1" latinLnBrk="0" hangingPunct="1">
-              <a:lnSpc>
-                <a:spcPct val="90000"/>
-              </a:lnSpc>
-              <a:spcBef>
-                <a:spcPts val="500"/>
-              </a:spcBef>
-              <a:buFont typeface="Arial"/>
-              <a:buChar char="•"/>
-              <a:defRPr sz="1800" kern="1200">
-                <a:solidFill>
-                  <a:schemeClr val="tx1"/>
-                </a:solidFill>
-                <a:latin typeface="+mn-lt"/>
-                <a:ea typeface="+mn-ea"/>
-                <a:cs typeface="+mn-cs"/>
-              </a:defRPr>
-            </a:lvl7pPr>
-            <a:lvl8pPr marL="3429000" indent="-228600" algn="l" defTabSz="914400" rtl="0" eaLnBrk="1" latinLnBrk="0" hangingPunct="1">
-              <a:lnSpc>
-                <a:spcPct val="90000"/>
-              </a:lnSpc>
-              <a:spcBef>
-                <a:spcPts val="500"/>
-              </a:spcBef>
-              <a:buFont typeface="Arial"/>
-              <a:buChar char="•"/>
-              <a:defRPr sz="1800" kern="1200">
-                <a:solidFill>
-                  <a:schemeClr val="tx1"/>
-                </a:solidFill>
-                <a:latin typeface="+mn-lt"/>
-                <a:ea typeface="+mn-ea"/>
-                <a:cs typeface="+mn-cs"/>
-              </a:defRPr>
-            </a:lvl8pPr>
-            <a:lvl9pPr marL="3886200" indent="-228600" algn="l" defTabSz="914400" rtl="0" eaLnBrk="1" latinLnBrk="0" hangingPunct="1">
-              <a:lnSpc>
-                <a:spcPct val="90000"/>
-              </a:lnSpc>
-              <a:spcBef>
-                <a:spcPts val="500"/>
-              </a:spcBef>
-              <a:buFont typeface="Arial"/>
-              <a:buChar char="•"/>
-              <a:defRPr sz="1800" kern="1200">
-                <a:solidFill>
-                  <a:schemeClr val="tx1"/>
-                </a:solidFill>
-                <a:latin typeface="+mn-lt"/>
-                <a:ea typeface="+mn-ea"/>
-                <a:cs typeface="+mn-cs"/>
-              </a:defRPr>
-            </a:lvl9pPr>
-          </a:lstStyle>
-          <a:p>
-            <a:pPr marL="0" indent="0">
-              <a:buFont typeface="Arial"/>
-              <a:buNone/>
-            </a:pPr>
-            <a:r>
-              <a:rPr lang="en-US" dirty="0"/>
-              <a:t>q</a:t>
-            </a:r>
-            <a:r>
-              <a:rPr lang="en-US" dirty="0" smtClean="0"/>
-              <a:t>=50</a:t>
-            </a:r>
-            <a:endParaRPr lang="en-US" dirty="0"/>
-          </a:p>
-        </p:txBody>
-      </p:sp>
-      <p:sp>
-        <p:nvSpPr>
-          <p:cNvPr id="8" name="Content Placeholder 2"/>
-          <p:cNvSpPr txBox="1">
-            <a:spLocks/>
-          </p:cNvSpPr>
-          <p:nvPr/>
-        </p:nvSpPr>
-        <p:spPr>
-          <a:xfrm>
-            <a:off x="9271000" y="3984624"/>
-            <a:ext cx="1473200" cy="498475"/>
-          </a:xfrm>
-          <a:prstGeom prst="rect">
-            <a:avLst/>
-          </a:prstGeom>
-        </p:spPr>
-        <p:txBody>
-          <a:bodyPr vert="horz" lIns="91440" tIns="45720" rIns="91440" bIns="45720" rtlCol="0">
-            <a:normAutofit/>
-          </a:bodyPr>
-          <a:lstStyle>
-            <a:lvl1pPr marL="228600" indent="-228600" algn="l" defTabSz="914400" rtl="0" eaLnBrk="1" latinLnBrk="0" hangingPunct="1">
-              <a:lnSpc>
-                <a:spcPct val="90000"/>
-              </a:lnSpc>
-              <a:spcBef>
-                <a:spcPts val="1000"/>
-              </a:spcBef>
-              <a:buFont typeface="Arial"/>
-              <a:buChar char="•"/>
-              <a:defRPr sz="2800" kern="1200">
-                <a:solidFill>
-                  <a:schemeClr val="tx1"/>
-                </a:solidFill>
-                <a:latin typeface="+mn-lt"/>
-                <a:ea typeface="+mn-ea"/>
-                <a:cs typeface="+mn-cs"/>
-              </a:defRPr>
-            </a:lvl1pPr>
-            <a:lvl2pPr marL="685800" indent="-228600" algn="l" defTabSz="914400" rtl="0" eaLnBrk="1" latinLnBrk="0" hangingPunct="1">
-              <a:lnSpc>
-                <a:spcPct val="90000"/>
-              </a:lnSpc>
-              <a:spcBef>
-                <a:spcPts val="500"/>
-              </a:spcBef>
-              <a:buFont typeface="Arial"/>
-              <a:buChar char="•"/>
-              <a:defRPr sz="2400" kern="1200">
-                <a:solidFill>
-                  <a:schemeClr val="tx1"/>
-                </a:solidFill>
-                <a:latin typeface="+mn-lt"/>
-                <a:ea typeface="+mn-ea"/>
-                <a:cs typeface="+mn-cs"/>
-              </a:defRPr>
-            </a:lvl2pPr>
-            <a:lvl3pPr marL="1143000" indent="-228600" algn="l" defTabSz="914400" rtl="0" eaLnBrk="1" latinLnBrk="0" hangingPunct="1">
-              <a:lnSpc>
-                <a:spcPct val="90000"/>
-              </a:lnSpc>
-              <a:spcBef>
-                <a:spcPts val="500"/>
-              </a:spcBef>
-              <a:buFont typeface="Arial"/>
-              <a:buChar char="•"/>
-              <a:defRPr sz="2000" kern="1200">
-                <a:solidFill>
-                  <a:schemeClr val="tx1"/>
-                </a:solidFill>
-                <a:latin typeface="+mn-lt"/>
-                <a:ea typeface="+mn-ea"/>
-                <a:cs typeface="+mn-cs"/>
-              </a:defRPr>
-            </a:lvl3pPr>
-            <a:lvl4pPr marL="1600200" indent="-228600" algn="l" defTabSz="914400" rtl="0" eaLnBrk="1" latinLnBrk="0" hangingPunct="1">
-              <a:lnSpc>
-                <a:spcPct val="90000"/>
-              </a:lnSpc>
-              <a:spcBef>
-                <a:spcPts val="500"/>
-              </a:spcBef>
-              <a:buFont typeface="Arial"/>
-              <a:buChar char="•"/>
-              <a:defRPr sz="1800" kern="1200">
-                <a:solidFill>
-                  <a:schemeClr val="tx1"/>
-                </a:solidFill>
-                <a:latin typeface="+mn-lt"/>
-                <a:ea typeface="+mn-ea"/>
-                <a:cs typeface="+mn-cs"/>
-              </a:defRPr>
-            </a:lvl4pPr>
-            <a:lvl5pPr marL="2057400" indent="-228600" algn="l" defTabSz="914400" rtl="0" eaLnBrk="1" latinLnBrk="0" hangingPunct="1">
-              <a:lnSpc>
-                <a:spcPct val="90000"/>
-              </a:lnSpc>
-              <a:spcBef>
-                <a:spcPts val="500"/>
-              </a:spcBef>
-              <a:buFont typeface="Arial"/>
-              <a:buChar char="•"/>
-              <a:defRPr sz="1800" kern="1200">
-                <a:solidFill>
-                  <a:schemeClr val="tx1"/>
-                </a:solidFill>
-                <a:latin typeface="+mn-lt"/>
-                <a:ea typeface="+mn-ea"/>
-                <a:cs typeface="+mn-cs"/>
-              </a:defRPr>
-            </a:lvl5pPr>
-            <a:lvl6pPr marL="2514600" indent="-228600" algn="l" defTabSz="914400" rtl="0" eaLnBrk="1" latinLnBrk="0" hangingPunct="1">
-              <a:lnSpc>
-                <a:spcPct val="90000"/>
-              </a:lnSpc>
-              <a:spcBef>
-                <a:spcPts val="500"/>
-              </a:spcBef>
-              <a:buFont typeface="Arial"/>
-              <a:buChar char="•"/>
-              <a:defRPr sz="1800" kern="1200">
-                <a:solidFill>
-                  <a:schemeClr val="tx1"/>
-                </a:solidFill>
-                <a:latin typeface="+mn-lt"/>
-                <a:ea typeface="+mn-ea"/>
-                <a:cs typeface="+mn-cs"/>
-              </a:defRPr>
-            </a:lvl6pPr>
-            <a:lvl7pPr marL="2971800" indent="-228600" algn="l" defTabSz="914400" rtl="0" eaLnBrk="1" latinLnBrk="0" hangingPunct="1">
-              <a:lnSpc>
-                <a:spcPct val="90000"/>
-              </a:lnSpc>
-              <a:spcBef>
-                <a:spcPts val="500"/>
-              </a:spcBef>
-              <a:buFont typeface="Arial"/>
-              <a:buChar char="•"/>
-              <a:defRPr sz="1800" kern="1200">
-                <a:solidFill>
-                  <a:schemeClr val="tx1"/>
-                </a:solidFill>
-                <a:latin typeface="+mn-lt"/>
-                <a:ea typeface="+mn-ea"/>
-                <a:cs typeface="+mn-cs"/>
-              </a:defRPr>
-            </a:lvl7pPr>
-            <a:lvl8pPr marL="3429000" indent="-228600" algn="l" defTabSz="914400" rtl="0" eaLnBrk="1" latinLnBrk="0" hangingPunct="1">
-              <a:lnSpc>
-                <a:spcPct val="90000"/>
-              </a:lnSpc>
-              <a:spcBef>
-                <a:spcPts val="500"/>
-              </a:spcBef>
-              <a:buFont typeface="Arial"/>
-              <a:buChar char="•"/>
-              <a:defRPr sz="1800" kern="1200">
-                <a:solidFill>
-                  <a:schemeClr val="tx1"/>
-                </a:solidFill>
-                <a:latin typeface="+mn-lt"/>
-                <a:ea typeface="+mn-ea"/>
-                <a:cs typeface="+mn-cs"/>
-              </a:defRPr>
-            </a:lvl8pPr>
-            <a:lvl9pPr marL="3886200" indent="-228600" algn="l" defTabSz="914400" rtl="0" eaLnBrk="1" latinLnBrk="0" hangingPunct="1">
-              <a:lnSpc>
-                <a:spcPct val="90000"/>
-              </a:lnSpc>
-              <a:spcBef>
-                <a:spcPts val="500"/>
-              </a:spcBef>
-              <a:buFont typeface="Arial"/>
-              <a:buChar char="•"/>
-              <a:defRPr sz="1800" kern="1200">
-                <a:solidFill>
-                  <a:schemeClr val="tx1"/>
-                </a:solidFill>
-                <a:latin typeface="+mn-lt"/>
-                <a:ea typeface="+mn-ea"/>
-                <a:cs typeface="+mn-cs"/>
-              </a:defRPr>
-            </a:lvl9pPr>
-          </a:lstStyle>
-          <a:p>
-            <a:pPr marL="0" indent="0">
-              <a:buFont typeface="Arial"/>
-              <a:buNone/>
-            </a:pPr>
-            <a:r>
-              <a:rPr lang="en-US" dirty="0" smtClean="0"/>
-              <a:t>q=90</a:t>
-            </a:r>
-            <a:endParaRPr lang="en-US" dirty="0"/>
-          </a:p>
-        </p:txBody>
-      </p:sp>
-      <p:pic>
-        <p:nvPicPr>
-          <p:cNvPr id="10" name="Picture 9"/>
-          <p:cNvPicPr>
-            <a:picLocks noChangeAspect="1"/>
-          </p:cNvPicPr>
-          <p:nvPr/>
-        </p:nvPicPr>
-        <p:blipFill>
-          <a:blip r:embed="rId3"/>
-          <a:stretch>
-            <a:fillRect/>
-          </a:stretch>
-        </p:blipFill>
-        <p:spPr>
-          <a:xfrm>
-            <a:off x="165100" y="4555008"/>
-            <a:ext cx="3759200" cy="1571153"/>
-          </a:xfrm>
-          <a:prstGeom prst="rect">
-            <a:avLst/>
-          </a:prstGeom>
-        </p:spPr>
-      </p:pic>
-      <p:pic>
-        <p:nvPicPr>
-          <p:cNvPr id="11" name="Picture 10"/>
-          <p:cNvPicPr>
-            <a:picLocks noChangeAspect="1"/>
-          </p:cNvPicPr>
-          <p:nvPr/>
-        </p:nvPicPr>
-        <p:blipFill>
-          <a:blip r:embed="rId4"/>
-          <a:stretch>
-            <a:fillRect/>
-          </a:stretch>
-        </p:blipFill>
-        <p:spPr>
-          <a:xfrm>
-            <a:off x="3962400" y="4553892"/>
-            <a:ext cx="3791358" cy="1572269"/>
-          </a:xfrm>
-          <a:prstGeom prst="rect">
-            <a:avLst/>
-          </a:prstGeom>
-        </p:spPr>
-      </p:pic>
-      <p:pic>
-        <p:nvPicPr>
-          <p:cNvPr id="12" name="Picture 11"/>
-          <p:cNvPicPr>
-            <a:picLocks noChangeAspect="1"/>
-          </p:cNvPicPr>
-          <p:nvPr/>
-        </p:nvPicPr>
-        <p:blipFill>
-          <a:blip r:embed="rId5"/>
-          <a:stretch>
-            <a:fillRect/>
-          </a:stretch>
-        </p:blipFill>
-        <p:spPr>
-          <a:xfrm>
-            <a:off x="8013699" y="4660125"/>
-            <a:ext cx="3580509" cy="1466035"/>
-          </a:xfrm>
-          <a:prstGeom prst="rect">
-            <a:avLst/>
-          </a:prstGeom>
-        </p:spPr>
-      </p:pic>
-    </p:spTree>
-    <p:extLst>
-      <p:ext uri="{BB962C8B-B14F-4D97-AF65-F5344CB8AC3E}">
-        <p14:creationId xmlns:p14="http://schemas.microsoft.com/office/powerpoint/2010/main" val="1845289850"/>
-      </p:ext>
-    </p:extLst>
-  </p:cSld>
-  <p:clrMapOvr>
-    <a:masterClrMapping/>
-  </p:clrMapOvr>
-</p:sld>
-</file>
-
-<file path=ppt/slides/slide4.xml><?xml version="1.0" encoding="utf-8"?>
-<p:sld xmlns:a="http://schemas.openxmlformats.org/drawingml/2006/main" xmlns:r="http://schemas.openxmlformats.org/officeDocument/2006/relationships" xmlns:p="http://schemas.openxmlformats.org/presentationml/2006/main">
-  <p:cSld>
-    <p:spTree>
-      <p:nvGrpSpPr>
-        <p:cNvPr id="1" name=""/>
-        <p:cNvGrpSpPr/>
-        <p:nvPr/>
-      </p:nvGrpSpPr>
-      <p:grpSpPr>
-        <a:xfrm>
-          <a:off x="0" y="0"/>
-          <a:ext cx="0" cy="0"/>
-          <a:chOff x="0" y="0"/>
-          <a:chExt cx="0" cy="0"/>
-        </a:xfrm>
-      </p:grpSpPr>
-      <p:sp>
-        <p:nvSpPr>
-          <p:cNvPr id="2" name="Title 1"/>
-          <p:cNvSpPr>
-            <a:spLocks noGrp="1"/>
-          </p:cNvSpPr>
-          <p:nvPr>
-            <p:ph type="title"/>
-          </p:nvPr>
-        </p:nvSpPr>
-        <p:spPr/>
-        <p:txBody>
-          <a:bodyPr/>
-          <a:lstStyle/>
-          <a:p>
-            <a:r>
-              <a:rPr lang="en-US" dirty="0" smtClean="0"/>
-              <a:t>Lossless Compression</a:t>
-            </a:r>
-            <a:endParaRPr lang="en-US" dirty="0"/>
-          </a:p>
-        </p:txBody>
-      </p:sp>
-      <p:sp>
-        <p:nvSpPr>
-          <p:cNvPr id="3" name="Content Placeholder 2"/>
-          <p:cNvSpPr>
-            <a:spLocks noGrp="1"/>
-          </p:cNvSpPr>
-          <p:nvPr>
-            <p:ph idx="1"/>
-          </p:nvPr>
-        </p:nvSpPr>
-        <p:spPr/>
-        <p:txBody>
-          <a:bodyPr/>
-          <a:lstStyle/>
-          <a:p>
-            <a:r>
-              <a:rPr lang="en-US" dirty="0" err="1" smtClean="0"/>
-              <a:t>Gzip</a:t>
-            </a:r>
-            <a:endParaRPr lang="en-US" dirty="0"/>
-          </a:p>
-        </p:txBody>
-      </p:sp>
-    </p:spTree>
-    <p:extLst>
-      <p:ext uri="{BB962C8B-B14F-4D97-AF65-F5344CB8AC3E}">
-        <p14:creationId xmlns:p14="http://schemas.microsoft.com/office/powerpoint/2010/main" val="1005653086"/>
-      </p:ext>
-    </p:extLst>
-  </p:cSld>
-  <p:clrMapOvr>
-    <a:masterClrMapping/>
-  </p:clrMapOvr>
-</p:sld>
-</file>
-
-<file path=ppt/slides/slide5.xml><?xml version="1.0" encoding="utf-8"?>
-<p:sld xmlns:a="http://schemas.openxmlformats.org/drawingml/2006/main" xmlns:r="http://schemas.openxmlformats.org/officeDocument/2006/relationships" xmlns:p="http://schemas.openxmlformats.org/presentationml/2006/main">
-  <p:cSld>
-    <p:spTree>
-      <p:nvGrpSpPr>
-        <p:cNvPr id="1" name=""/>
-        <p:cNvGrpSpPr/>
-        <p:nvPr/>
-      </p:nvGrpSpPr>
-      <p:grpSpPr>
-        <a:xfrm>
-          <a:off x="0" y="0"/>
-          <a:ext cx="0" cy="0"/>
-          <a:chOff x="0" y="0"/>
-          <a:chExt cx="0" cy="0"/>
-        </a:xfrm>
-      </p:grpSpPr>
-      <p:sp>
-        <p:nvSpPr>
-          <p:cNvPr id="2" name="Title 1"/>
-          <p:cNvSpPr>
-            <a:spLocks noGrp="1"/>
-          </p:cNvSpPr>
-          <p:nvPr>
-            <p:ph type="title"/>
-          </p:nvPr>
-        </p:nvSpPr>
-        <p:spPr/>
-        <p:txBody>
-          <a:bodyPr/>
-          <a:lstStyle/>
-          <a:p>
-            <a:r>
-              <a:rPr lang="en-US" dirty="0" smtClean="0"/>
-              <a:t>Packets</a:t>
-            </a:r>
-            <a:endParaRPr lang="en-US" dirty="0"/>
-          </a:p>
-        </p:txBody>
-      </p:sp>
-      <p:sp>
-        <p:nvSpPr>
-          <p:cNvPr id="3" name="Content Placeholder 2"/>
-          <p:cNvSpPr>
-            <a:spLocks noGrp="1"/>
-          </p:cNvSpPr>
-          <p:nvPr>
-            <p:ph idx="1"/>
-          </p:nvPr>
-        </p:nvSpPr>
-        <p:spPr/>
-        <p:txBody>
-          <a:bodyPr/>
-          <a:lstStyle/>
-          <a:p>
-            <a:endParaRPr lang="en-US"/>
-          </a:p>
-        </p:txBody>
-      </p:sp>
-    </p:spTree>
-    <p:extLst>
-      <p:ext uri="{BB962C8B-B14F-4D97-AF65-F5344CB8AC3E}">
-        <p14:creationId xmlns:p14="http://schemas.microsoft.com/office/powerpoint/2010/main" val="1453757304"/>
-      </p:ext>
-    </p:extLst>
-  </p:cSld>
-  <p:clrMapOvr>
-    <a:masterClrMapping/>
-  </p:clrMapOvr>
-</p:sld>
-</file>
-
-<file path=ppt/slides/slide6.xml><?xml version="1.0" encoding="utf-8"?>
-<p:sld xmlns:a="http://schemas.openxmlformats.org/drawingml/2006/main" xmlns:r="http://schemas.openxmlformats.org/officeDocument/2006/relationships" xmlns:p="http://schemas.openxmlformats.org/presentationml/2006/main">
-  <p:cSld>
-    <p:spTree>
-      <p:nvGrpSpPr>
-        <p:cNvPr id="1" name=""/>
-        <p:cNvGrpSpPr/>
-        <p:nvPr/>
-      </p:nvGrpSpPr>
-      <p:grpSpPr>
-        <a:xfrm>
-          <a:off x="0" y="0"/>
-          <a:ext cx="0" cy="0"/>
-          <a:chOff x="0" y="0"/>
-          <a:chExt cx="0" cy="0"/>
-        </a:xfrm>
-      </p:grpSpPr>
-      <p:sp>
-        <p:nvSpPr>
-          <p:cNvPr id="2" name="Title 1"/>
-          <p:cNvSpPr>
-            <a:spLocks noGrp="1"/>
-          </p:cNvSpPr>
-          <p:nvPr>
-            <p:ph type="title"/>
-          </p:nvPr>
-        </p:nvSpPr>
-        <p:spPr/>
-        <p:txBody>
-          <a:bodyPr/>
-          <a:lstStyle/>
-          <a:p>
-            <a:r>
-              <a:rPr lang="en-US" dirty="0" smtClean="0"/>
-              <a:t>Network</a:t>
-            </a:r>
-            <a:endParaRPr lang="en-US" dirty="0"/>
-          </a:p>
-        </p:txBody>
-      </p:sp>
-      <p:sp>
-        <p:nvSpPr>
-          <p:cNvPr id="3" name="Content Placeholder 2"/>
-          <p:cNvSpPr>
-            <a:spLocks noGrp="1"/>
-          </p:cNvSpPr>
-          <p:nvPr>
-            <p:ph idx="1"/>
-          </p:nvPr>
-        </p:nvSpPr>
-        <p:spPr/>
-        <p:txBody>
-          <a:bodyPr/>
-          <a:lstStyle/>
-          <a:p>
-            <a:endParaRPr lang="en-US"/>
-          </a:p>
-        </p:txBody>
-      </p:sp>
-    </p:spTree>
-    <p:extLst>
-      <p:ext uri="{BB962C8B-B14F-4D97-AF65-F5344CB8AC3E}">
-        <p14:creationId xmlns:p14="http://schemas.microsoft.com/office/powerpoint/2010/main" val="1215310775"/>
-      </p:ext>
-    </p:extLst>
-  </p:cSld>
-  <p:clrMapOvr>
-    <a:masterClrMapping/>
-  </p:clrMapOvr>
-</p:sld>
-</file>
-
-<file path=ppt/slides/slide7.xml><?xml version="1.0" encoding="utf-8"?>
-<p:sld xmlns:a="http://schemas.openxmlformats.org/drawingml/2006/main" xmlns:r="http://schemas.openxmlformats.org/officeDocument/2006/relationships" xmlns:p="http://schemas.openxmlformats.org/presentationml/2006/main">
-  <p:cSld>
-    <p:spTree>
-      <p:nvGrpSpPr>
-        <p:cNvPr id="1" name=""/>
-        <p:cNvGrpSpPr/>
-        <p:nvPr/>
-      </p:nvGrpSpPr>
-      <p:grpSpPr>
-        <a:xfrm>
-          <a:off x="0" y="0"/>
-          <a:ext cx="0" cy="0"/>
-          <a:chOff x="0" y="0"/>
-          <a:chExt cx="0" cy="0"/>
-        </a:xfrm>
-      </p:grpSpPr>
-      <p:sp>
-        <p:nvSpPr>
-          <p:cNvPr id="2" name="Title 1"/>
-          <p:cNvSpPr>
-            <a:spLocks noGrp="1"/>
-          </p:cNvSpPr>
-          <p:nvPr>
-            <p:ph type="title"/>
-          </p:nvPr>
-        </p:nvSpPr>
-        <p:spPr/>
-        <p:txBody>
-          <a:bodyPr/>
-          <a:lstStyle/>
-          <a:p>
-            <a:r>
-              <a:rPr lang="en-US" dirty="0" smtClean="0"/>
-              <a:t>Physical Layer</a:t>
-            </a:r>
-            <a:endParaRPr lang="en-US" dirty="0"/>
-          </a:p>
-        </p:txBody>
-      </p:sp>
-      <p:sp>
-        <p:nvSpPr>
-          <p:cNvPr id="3" name="Content Placeholder 2"/>
-          <p:cNvSpPr>
-            <a:spLocks noGrp="1"/>
-          </p:cNvSpPr>
-          <p:nvPr>
-            <p:ph idx="1"/>
-          </p:nvPr>
-        </p:nvSpPr>
-        <p:spPr>
-          <a:xfrm>
-            <a:off x="838200" y="1825625"/>
-            <a:ext cx="5499100" cy="4351338"/>
-          </a:xfrm>
-        </p:spPr>
-        <p:txBody>
-          <a:bodyPr>
-            <a:normAutofit fontScale="92500" lnSpcReduction="10000"/>
-          </a:bodyPr>
-          <a:lstStyle/>
-          <a:p>
-            <a:r>
-              <a:rPr lang="en-US" dirty="0" smtClean="0"/>
-              <a:t>Looked into Multiple Frequency Shift Keying (MFSK)</a:t>
-            </a:r>
-          </a:p>
-          <a:p>
-            <a:r>
-              <a:rPr lang="en-US" dirty="0" smtClean="0"/>
-              <a:t>Went with </a:t>
-            </a:r>
-            <a:r>
-              <a:rPr lang="en-US" b="1" dirty="0" smtClean="0"/>
-              <a:t>Minimum Shift Keying (MSK) </a:t>
-            </a:r>
-            <a:r>
-              <a:rPr lang="en-US" dirty="0" smtClean="0"/>
-              <a:t>for simplicity</a:t>
-            </a:r>
-          </a:p>
-          <a:p>
-            <a:r>
-              <a:rPr lang="en-US" dirty="0" smtClean="0"/>
-              <a:t>FM Bandwidth is only 3kHz</a:t>
-            </a:r>
-          </a:p>
-          <a:p>
-            <a:r>
-              <a:rPr lang="en-US" dirty="0" smtClean="0"/>
-              <a:t>Went with </a:t>
-            </a:r>
-            <a:r>
-              <a:rPr lang="en-US" dirty="0" err="1" smtClean="0"/>
-              <a:t>mark_f</a:t>
-            </a:r>
-            <a:r>
-              <a:rPr lang="en-US" dirty="0" smtClean="0"/>
-              <a:t> = 1200 HZ, </a:t>
-            </a:r>
-            <a:r>
-              <a:rPr lang="en-US" dirty="0" err="1" smtClean="0"/>
-              <a:t>space_f</a:t>
-            </a:r>
-            <a:r>
-              <a:rPr lang="en-US" dirty="0" smtClean="0"/>
-              <a:t> = 2400 Hz and baud rate = 2400</a:t>
-            </a:r>
-          </a:p>
-          <a:p>
-            <a:r>
-              <a:rPr lang="en-US" dirty="0" smtClean="0"/>
-              <a:t>Each bit encoded as half sinusoid (mark) or full sinusoid (space) as a result of having the mark and space frequencies divide the baud rate</a:t>
-            </a:r>
-          </a:p>
-          <a:p>
-            <a:endParaRPr lang="en-US" dirty="0" smtClean="0"/>
-          </a:p>
-        </p:txBody>
-      </p:sp>
-      <p:pic>
-        <p:nvPicPr>
-          <p:cNvPr id="4" name="Picture 3"/>
-          <p:cNvPicPr>
-            <a:picLocks noChangeAspect="1"/>
-          </p:cNvPicPr>
-          <p:nvPr/>
-        </p:nvPicPr>
-        <p:blipFill>
-          <a:blip r:embed="rId2"/>
-          <a:stretch>
-            <a:fillRect/>
-          </a:stretch>
-        </p:blipFill>
-        <p:spPr>
-          <a:xfrm>
-            <a:off x="6692900" y="1690688"/>
-            <a:ext cx="4927600" cy="3289300"/>
-          </a:xfrm>
-          <a:prstGeom prst="rect">
-            <a:avLst/>
-          </a:prstGeom>
-        </p:spPr>
-      </p:pic>
-      <p:sp>
-        <p:nvSpPr>
-          <p:cNvPr id="5" name="Content Placeholder 2"/>
-          <p:cNvSpPr txBox="1">
-            <a:spLocks/>
-          </p:cNvSpPr>
-          <p:nvPr/>
-        </p:nvSpPr>
-        <p:spPr>
-          <a:xfrm>
-            <a:off x="6692900" y="4979988"/>
-            <a:ext cx="5499100" cy="4351338"/>
-          </a:xfrm>
-          <a:prstGeom prst="rect">
-            <a:avLst/>
-          </a:prstGeom>
-        </p:spPr>
-        <p:txBody>
-          <a:bodyPr vert="horz" lIns="91440" tIns="45720" rIns="91440" bIns="45720" rtlCol="0">
-            <a:normAutofit/>
-          </a:bodyPr>
-          <a:lstStyle>
-            <a:lvl1pPr marL="228600" indent="-228600" algn="l" defTabSz="914400" rtl="0" eaLnBrk="1" latinLnBrk="0" hangingPunct="1">
-              <a:lnSpc>
-                <a:spcPct val="90000"/>
-              </a:lnSpc>
-              <a:spcBef>
-                <a:spcPts val="1000"/>
-              </a:spcBef>
-              <a:buFont typeface="Arial"/>
-              <a:buChar char="•"/>
-              <a:defRPr sz="2800" kern="1200">
-                <a:solidFill>
-                  <a:schemeClr val="tx1"/>
-                </a:solidFill>
-                <a:latin typeface="+mn-lt"/>
-                <a:ea typeface="+mn-ea"/>
-                <a:cs typeface="+mn-cs"/>
-              </a:defRPr>
-            </a:lvl1pPr>
-            <a:lvl2pPr marL="685800" indent="-228600" algn="l" defTabSz="914400" rtl="0" eaLnBrk="1" latinLnBrk="0" hangingPunct="1">
-              <a:lnSpc>
-                <a:spcPct val="90000"/>
-              </a:lnSpc>
-              <a:spcBef>
-                <a:spcPts val="500"/>
-              </a:spcBef>
-              <a:buFont typeface="Arial"/>
-              <a:buChar char="•"/>
-              <a:defRPr sz="2400" kern="1200">
-                <a:solidFill>
-                  <a:schemeClr val="tx1"/>
-                </a:solidFill>
-                <a:latin typeface="+mn-lt"/>
-                <a:ea typeface="+mn-ea"/>
-                <a:cs typeface="+mn-cs"/>
-              </a:defRPr>
-            </a:lvl2pPr>
-            <a:lvl3pPr marL="1143000" indent="-228600" algn="l" defTabSz="914400" rtl="0" eaLnBrk="1" latinLnBrk="0" hangingPunct="1">
-              <a:lnSpc>
-                <a:spcPct val="90000"/>
-              </a:lnSpc>
-              <a:spcBef>
-                <a:spcPts val="500"/>
-              </a:spcBef>
-              <a:buFont typeface="Arial"/>
-              <a:buChar char="•"/>
-              <a:defRPr sz="2000" kern="1200">
-                <a:solidFill>
-                  <a:schemeClr val="tx1"/>
-                </a:solidFill>
-                <a:latin typeface="+mn-lt"/>
-                <a:ea typeface="+mn-ea"/>
-                <a:cs typeface="+mn-cs"/>
-              </a:defRPr>
-            </a:lvl3pPr>
-            <a:lvl4pPr marL="1600200" indent="-228600" algn="l" defTabSz="914400" rtl="0" eaLnBrk="1" latinLnBrk="0" hangingPunct="1">
-              <a:lnSpc>
-                <a:spcPct val="90000"/>
-              </a:lnSpc>
-              <a:spcBef>
-                <a:spcPts val="500"/>
-              </a:spcBef>
-              <a:buFont typeface="Arial"/>
-              <a:buChar char="•"/>
-              <a:defRPr sz="1800" kern="1200">
-                <a:solidFill>
-                  <a:schemeClr val="tx1"/>
-                </a:solidFill>
-                <a:latin typeface="+mn-lt"/>
-                <a:ea typeface="+mn-ea"/>
-                <a:cs typeface="+mn-cs"/>
-              </a:defRPr>
-            </a:lvl4pPr>
-            <a:lvl5pPr marL="2057400" indent="-228600" algn="l" defTabSz="914400" rtl="0" eaLnBrk="1" latinLnBrk="0" hangingPunct="1">
-              <a:lnSpc>
-                <a:spcPct val="90000"/>
-              </a:lnSpc>
-              <a:spcBef>
-                <a:spcPts val="500"/>
-              </a:spcBef>
-              <a:buFont typeface="Arial"/>
-              <a:buChar char="•"/>
-              <a:defRPr sz="1800" kern="1200">
-                <a:solidFill>
-                  <a:schemeClr val="tx1"/>
-                </a:solidFill>
-                <a:latin typeface="+mn-lt"/>
-                <a:ea typeface="+mn-ea"/>
-                <a:cs typeface="+mn-cs"/>
-              </a:defRPr>
-            </a:lvl5pPr>
-            <a:lvl6pPr marL="2514600" indent="-228600" algn="l" defTabSz="914400" rtl="0" eaLnBrk="1" latinLnBrk="0" hangingPunct="1">
-              <a:lnSpc>
-                <a:spcPct val="90000"/>
-              </a:lnSpc>
-              <a:spcBef>
-                <a:spcPts val="500"/>
-              </a:spcBef>
-              <a:buFont typeface="Arial"/>
-              <a:buChar char="•"/>
-              <a:defRPr sz="1800" kern="1200">
-                <a:solidFill>
-                  <a:schemeClr val="tx1"/>
-                </a:solidFill>
-                <a:latin typeface="+mn-lt"/>
-                <a:ea typeface="+mn-ea"/>
-                <a:cs typeface="+mn-cs"/>
-              </a:defRPr>
-            </a:lvl6pPr>
-            <a:lvl7pPr marL="2971800" indent="-228600" algn="l" defTabSz="914400" rtl="0" eaLnBrk="1" latinLnBrk="0" hangingPunct="1">
-              <a:lnSpc>
-                <a:spcPct val="90000"/>
-              </a:lnSpc>
-              <a:spcBef>
-                <a:spcPts val="500"/>
-              </a:spcBef>
-              <a:buFont typeface="Arial"/>
-              <a:buChar char="•"/>
-              <a:defRPr sz="1800" kern="1200">
-                <a:solidFill>
-                  <a:schemeClr val="tx1"/>
-                </a:solidFill>
-                <a:latin typeface="+mn-lt"/>
-                <a:ea typeface="+mn-ea"/>
-                <a:cs typeface="+mn-cs"/>
-              </a:defRPr>
-            </a:lvl7pPr>
-            <a:lvl8pPr marL="3429000" indent="-228600" algn="l" defTabSz="914400" rtl="0" eaLnBrk="1" latinLnBrk="0" hangingPunct="1">
-              <a:lnSpc>
-                <a:spcPct val="90000"/>
-              </a:lnSpc>
-              <a:spcBef>
-                <a:spcPts val="500"/>
-              </a:spcBef>
-              <a:buFont typeface="Arial"/>
-              <a:buChar char="•"/>
-              <a:defRPr sz="1800" kern="1200">
-                <a:solidFill>
-                  <a:schemeClr val="tx1"/>
-                </a:solidFill>
-                <a:latin typeface="+mn-lt"/>
-                <a:ea typeface="+mn-ea"/>
-                <a:cs typeface="+mn-cs"/>
-              </a:defRPr>
-            </a:lvl8pPr>
-            <a:lvl9pPr marL="3886200" indent="-228600" algn="l" defTabSz="914400" rtl="0" eaLnBrk="1" latinLnBrk="0" hangingPunct="1">
-              <a:lnSpc>
-                <a:spcPct val="90000"/>
-              </a:lnSpc>
-              <a:spcBef>
-                <a:spcPts val="500"/>
-              </a:spcBef>
-              <a:buFont typeface="Arial"/>
-              <a:buChar char="•"/>
-              <a:defRPr sz="1800" kern="1200">
-                <a:solidFill>
-                  <a:schemeClr val="tx1"/>
-                </a:solidFill>
-                <a:latin typeface="+mn-lt"/>
-                <a:ea typeface="+mn-ea"/>
-                <a:cs typeface="+mn-cs"/>
-              </a:defRPr>
-            </a:lvl9pPr>
-          </a:lstStyle>
-          <a:p>
-            <a:pPr marL="0" indent="0">
               <a:buNone/>
             </a:pPr>
             <a:r>
@@ -4653,6 +4298,13 @@
   <p:clrMapOvr>
     <a:masterClrMapping/>
   </p:clrMapOvr>
+  <p:timing>
+    <p:tnLst>
+      <p:par>
+        <p:cTn id="1" dur="indefinite" restart="never" nodeType="tmRoot"/>
+      </p:par>
+    </p:tnLst>
+  </p:timing>
 </p:sld>
 </file>
 
@@ -4688,23 +4340,36 @@
           <a:bodyPr/>
           <a:lstStyle/>
           <a:p>
-            <a:r>
-              <a:rPr lang="en-US" dirty="0" smtClean="0"/>
-              <a:t>Modified Demodulator (no pun intended)</a:t>
-            </a:r>
-            <a:endParaRPr lang="en-US" dirty="0"/>
+            <a:endParaRPr lang="en-US"/>
+          </a:p>
+        </p:txBody>
+      </p:sp>
+      <p:sp>
+        <p:nvSpPr>
+          <p:cNvPr id="3" name="Content Placeholder 2"/>
+          <p:cNvSpPr>
+            <a:spLocks noGrp="1"/>
+          </p:cNvSpPr>
+          <p:nvPr>
+            <p:ph idx="1"/>
+          </p:nvPr>
+        </p:nvSpPr>
+        <p:spPr/>
+        <p:txBody>
+          <a:bodyPr/>
+          <a:lstStyle/>
+          <a:p>
+            <a:endParaRPr lang="en-US"/>
           </a:p>
         </p:txBody>
       </p:sp>
       <p:pic>
         <p:nvPicPr>
-          <p:cNvPr id="4" name="Content Placeholder 3"/>
+          <p:cNvPr id="4" name="Picture 3"/>
           <p:cNvPicPr>
-            <a:picLocks noGrp="1" noChangeAspect="1"/>
+            <a:picLocks noChangeAspect="1"/>
           </p:cNvPicPr>
-          <p:nvPr>
-            <p:ph idx="1"/>
-          </p:nvPr>
+          <p:nvPr/>
         </p:nvPicPr>
         <p:blipFill>
           <a:blip r:embed="rId2"/>
@@ -4714,176 +4379,55 @@
         </p:blipFill>
         <p:spPr>
           <a:xfrm>
-            <a:off x="838200" y="2630488"/>
-            <a:ext cx="10515600" cy="2349563"/>
+            <a:off x="2133600" y="1825625"/>
+            <a:ext cx="7372350" cy="2064566"/>
           </a:xfrm>
           <a:prstGeom prst="rect">
             <a:avLst/>
           </a:prstGeom>
         </p:spPr>
       </p:pic>
-      <p:sp>
-        <p:nvSpPr>
-          <p:cNvPr id="5" name="TextBox 4"/>
-          <p:cNvSpPr txBox="1"/>
+      <p:pic>
+        <p:nvPicPr>
+          <p:cNvPr id="5" name="Picture 4"/>
+          <p:cNvPicPr>
+            <a:picLocks noChangeAspect="1"/>
+          </p:cNvPicPr>
           <p:nvPr/>
-        </p:nvSpPr>
+        </p:nvPicPr>
+        <p:blipFill>
+          <a:blip r:embed="rId3"/>
+          <a:stretch>
+            <a:fillRect/>
+          </a:stretch>
+        </p:blipFill>
         <p:spPr>
           <a:xfrm>
-            <a:off x="4076700" y="4165600"/>
-            <a:ext cx="1066800" cy="369332"/>
+            <a:off x="2286000" y="3921964"/>
+            <a:ext cx="7620000" cy="2307409"/>
           </a:xfrm>
           <a:prstGeom prst="rect">
             <a:avLst/>
           </a:prstGeom>
-          <a:noFill/>
         </p:spPr>
-        <p:txBody>
-          <a:bodyPr wrap="square" rtlCol="0">
-            <a:spAutoFit/>
-          </a:bodyPr>
-          <a:lstStyle/>
-          <a:p>
-            <a:r>
-              <a:rPr lang="en-US" dirty="0" smtClean="0">
-                <a:solidFill>
-                  <a:srgbClr val="FF0000"/>
-                </a:solidFill>
-              </a:rPr>
-              <a:t>2400</a:t>
-            </a:r>
-            <a:endParaRPr lang="en-US" dirty="0">
-              <a:solidFill>
-                <a:srgbClr val="FF0000"/>
-              </a:solidFill>
-            </a:endParaRPr>
-          </a:p>
-        </p:txBody>
-      </p:sp>
-      <p:sp>
-        <p:nvSpPr>
-          <p:cNvPr id="6" name="TextBox 5"/>
-          <p:cNvSpPr txBox="1"/>
-          <p:nvPr/>
-        </p:nvSpPr>
-        <p:spPr>
-          <a:xfrm>
-            <a:off x="1473200" y="3817969"/>
-            <a:ext cx="1536700" cy="369332"/>
-          </a:xfrm>
-          <a:prstGeom prst="rect">
-            <a:avLst/>
-          </a:prstGeom>
-          <a:noFill/>
-        </p:spPr>
-        <p:txBody>
-          <a:bodyPr wrap="square" rtlCol="0">
-            <a:spAutoFit/>
-          </a:bodyPr>
-          <a:lstStyle/>
-          <a:p>
-            <a:r>
-              <a:rPr lang="en-US" smtClean="0">
-                <a:solidFill>
-                  <a:srgbClr val="FF0000"/>
-                </a:solidFill>
-              </a:rPr>
-              <a:t>900-2700 Hz</a:t>
-            </a:r>
-            <a:endParaRPr lang="en-US" dirty="0">
-              <a:solidFill>
-                <a:srgbClr val="FF0000"/>
-              </a:solidFill>
-            </a:endParaRPr>
-          </a:p>
-        </p:txBody>
-      </p:sp>
-      <p:sp>
-        <p:nvSpPr>
-          <p:cNvPr id="7" name="TextBox 6"/>
-          <p:cNvSpPr txBox="1"/>
-          <p:nvPr/>
-        </p:nvSpPr>
-        <p:spPr>
-          <a:xfrm>
-            <a:off x="7073900" y="3876152"/>
-            <a:ext cx="1066800" cy="369332"/>
-          </a:xfrm>
-          <a:prstGeom prst="rect">
-            <a:avLst/>
-          </a:prstGeom>
-          <a:noFill/>
-        </p:spPr>
-        <p:txBody>
-          <a:bodyPr wrap="square" rtlCol="0">
-            <a:spAutoFit/>
-          </a:bodyPr>
-          <a:lstStyle/>
-          <a:p>
-            <a:r>
-              <a:rPr lang="en-US" dirty="0" smtClean="0">
-                <a:solidFill>
-                  <a:srgbClr val="FF0000"/>
-                </a:solidFill>
-              </a:rPr>
-              <a:t>1400</a:t>
-            </a:r>
-            <a:endParaRPr lang="en-US" dirty="0">
-              <a:solidFill>
-                <a:srgbClr val="FF0000"/>
-              </a:solidFill>
-            </a:endParaRPr>
-          </a:p>
-        </p:txBody>
-      </p:sp>
-      <p:sp>
-        <p:nvSpPr>
-          <p:cNvPr id="8" name="TextBox 7"/>
-          <p:cNvSpPr txBox="1"/>
-          <p:nvPr/>
-        </p:nvSpPr>
-        <p:spPr>
-          <a:xfrm>
-            <a:off x="9918700" y="2998288"/>
-            <a:ext cx="1066800" cy="369332"/>
-          </a:xfrm>
-          <a:prstGeom prst="rect">
-            <a:avLst/>
-          </a:prstGeom>
-          <a:noFill/>
-        </p:spPr>
-        <p:txBody>
-          <a:bodyPr wrap="square" rtlCol="0">
-            <a:spAutoFit/>
-          </a:bodyPr>
-          <a:lstStyle/>
-          <a:p>
-            <a:r>
-              <a:rPr lang="en-US" smtClean="0">
-                <a:solidFill>
-                  <a:srgbClr val="FF0000"/>
-                </a:solidFill>
-              </a:rPr>
-              <a:t>2400Hz</a:t>
-            </a:r>
-            <a:endParaRPr lang="en-US" dirty="0">
-              <a:solidFill>
-                <a:srgbClr val="FF0000"/>
-              </a:solidFill>
-            </a:endParaRPr>
-          </a:p>
-        </p:txBody>
-      </p:sp>
+      </p:pic>
     </p:spTree>
     <p:extLst>
       <p:ext uri="{BB962C8B-B14F-4D97-AF65-F5344CB8AC3E}">
-        <p14:creationId xmlns:p14="http://schemas.microsoft.com/office/powerpoint/2010/main" val="1620821836"/>
+        <p14:creationId xmlns:p14="http://schemas.microsoft.com/office/powerpoint/2010/main" val="284610264"/>
       </p:ext>
     </p:extLst>
   </p:cSld>
   <p:clrMapOvr>
     <a:masterClrMapping/>
   </p:clrMapOvr>
+  <p:timing>
+    <p:tnLst>
+      <p:par>
+        <p:cTn id="1" dur="indefinite" restart="never" nodeType="tmRoot"/>
+      </p:par>
+    </p:tnLst>
+  </p:timing>
 </p:sld>
 </file>
 
@@ -4921,51 +4465,207 @@
           <a:p>
             <a:r>
               <a:rPr lang="en-US" dirty="0" smtClean="0"/>
-              <a:t>Results and BER</a:t>
+              <a:t>Modified Demodulator (no pun intended)</a:t>
             </a:r>
             <a:endParaRPr lang="en-US" dirty="0"/>
           </a:p>
         </p:txBody>
       </p:sp>
-      <p:sp>
-        <p:nvSpPr>
-          <p:cNvPr id="3" name="Content Placeholder 2"/>
-          <p:cNvSpPr>
-            <a:spLocks noGrp="1"/>
-          </p:cNvSpPr>
+      <p:pic>
+        <p:nvPicPr>
+          <p:cNvPr id="4" name="Content Placeholder 3"/>
+          <p:cNvPicPr>
+            <a:picLocks noGrp="1" noChangeAspect="1"/>
+          </p:cNvPicPr>
           <p:nvPr>
             <p:ph idx="1"/>
           </p:nvPr>
-        </p:nvSpPr>
-        <p:spPr/>
-        <p:txBody>
-          <a:bodyPr/>
-          <a:lstStyle/>
-          <a:p>
-            <a:r>
-              <a:rPr lang="en-US" dirty="0" smtClean="0"/>
-              <a:t>We’ve doubled the baud rate and thus the amount of bits we can send in the time period</a:t>
-            </a:r>
-          </a:p>
-          <a:p>
-            <a:r>
-              <a:rPr lang="en-US" dirty="0" smtClean="0"/>
-              <a:t>However, how much more likely is it for the transmission to fail and how does this affect our entire system?</a:t>
-            </a:r>
-            <a:endParaRPr lang="en-US" dirty="0"/>
+        </p:nvPicPr>
+        <p:blipFill>
+          <a:blip r:embed="rId2"/>
+          <a:stretch>
+            <a:fillRect/>
+          </a:stretch>
+        </p:blipFill>
+        <p:spPr>
+          <a:xfrm>
+            <a:off x="838200" y="2630488"/>
+            <a:ext cx="10515600" cy="2349563"/>
+          </a:xfrm>
+          <a:prstGeom prst="rect">
+            <a:avLst/>
+          </a:prstGeom>
+        </p:spPr>
+      </p:pic>
+      <p:sp>
+        <p:nvSpPr>
+          <p:cNvPr id="5" name="TextBox 4"/>
+          <p:cNvSpPr txBox="1"/>
+          <p:nvPr/>
+        </p:nvSpPr>
+        <p:spPr>
+          <a:xfrm>
+            <a:off x="4076700" y="4165600"/>
+            <a:ext cx="1066800" cy="369332"/>
+          </a:xfrm>
+          <a:prstGeom prst="rect">
+            <a:avLst/>
+          </a:prstGeom>
+          <a:noFill/>
+        </p:spPr>
+        <p:txBody>
+          <a:bodyPr wrap="square" rtlCol="0">
+            <a:spAutoFit/>
+          </a:bodyPr>
+          <a:lstStyle/>
+          <a:p>
+            <a:r>
+              <a:rPr lang="en-US" dirty="0" smtClean="0">
+                <a:solidFill>
+                  <a:srgbClr val="FF0000"/>
+                </a:solidFill>
+              </a:rPr>
+              <a:t>2400</a:t>
+            </a:r>
+            <a:endParaRPr lang="en-US" dirty="0">
+              <a:solidFill>
+                <a:srgbClr val="FF0000"/>
+              </a:solidFill>
+            </a:endParaRPr>
+          </a:p>
+        </p:txBody>
+      </p:sp>
+      <p:sp>
+        <p:nvSpPr>
+          <p:cNvPr id="6" name="TextBox 5"/>
+          <p:cNvSpPr txBox="1"/>
+          <p:nvPr/>
+        </p:nvSpPr>
+        <p:spPr>
+          <a:xfrm>
+            <a:off x="1473200" y="3817969"/>
+            <a:ext cx="1536700" cy="369332"/>
+          </a:xfrm>
+          <a:prstGeom prst="rect">
+            <a:avLst/>
+          </a:prstGeom>
+          <a:noFill/>
+        </p:spPr>
+        <p:txBody>
+          <a:bodyPr wrap="square" rtlCol="0">
+            <a:spAutoFit/>
+          </a:bodyPr>
+          <a:lstStyle/>
+          <a:p>
+            <a:r>
+              <a:rPr lang="en-US" smtClean="0">
+                <a:solidFill>
+                  <a:srgbClr val="FF0000"/>
+                </a:solidFill>
+              </a:rPr>
+              <a:t>900-2700 Hz</a:t>
+            </a:r>
+            <a:endParaRPr lang="en-US" dirty="0">
+              <a:solidFill>
+                <a:srgbClr val="FF0000"/>
+              </a:solidFill>
+            </a:endParaRPr>
+          </a:p>
+        </p:txBody>
+      </p:sp>
+      <p:sp>
+        <p:nvSpPr>
+          <p:cNvPr id="7" name="TextBox 6"/>
+          <p:cNvSpPr txBox="1"/>
+          <p:nvPr/>
+        </p:nvSpPr>
+        <p:spPr>
+          <a:xfrm>
+            <a:off x="7073900" y="3876152"/>
+            <a:ext cx="1066800" cy="369332"/>
+          </a:xfrm>
+          <a:prstGeom prst="rect">
+            <a:avLst/>
+          </a:prstGeom>
+          <a:noFill/>
+        </p:spPr>
+        <p:txBody>
+          <a:bodyPr wrap="square" rtlCol="0">
+            <a:spAutoFit/>
+          </a:bodyPr>
+          <a:lstStyle/>
+          <a:p>
+            <a:r>
+              <a:rPr lang="en-US" dirty="0" smtClean="0">
+                <a:solidFill>
+                  <a:srgbClr val="FF0000"/>
+                </a:solidFill>
+              </a:rPr>
+              <a:t>1400</a:t>
+            </a:r>
+            <a:endParaRPr lang="en-US" dirty="0">
+              <a:solidFill>
+                <a:srgbClr val="FF0000"/>
+              </a:solidFill>
+            </a:endParaRPr>
+          </a:p>
+        </p:txBody>
+      </p:sp>
+      <p:sp>
+        <p:nvSpPr>
+          <p:cNvPr id="8" name="TextBox 7"/>
+          <p:cNvSpPr txBox="1"/>
+          <p:nvPr/>
+        </p:nvSpPr>
+        <p:spPr>
+          <a:xfrm>
+            <a:off x="9918700" y="2998288"/>
+            <a:ext cx="1066800" cy="369332"/>
+          </a:xfrm>
+          <a:prstGeom prst="rect">
+            <a:avLst/>
+          </a:prstGeom>
+          <a:noFill/>
+        </p:spPr>
+        <p:txBody>
+          <a:bodyPr wrap="square" rtlCol="0">
+            <a:spAutoFit/>
+          </a:bodyPr>
+          <a:lstStyle/>
+          <a:p>
+            <a:r>
+              <a:rPr lang="en-US" smtClean="0">
+                <a:solidFill>
+                  <a:srgbClr val="FF0000"/>
+                </a:solidFill>
+              </a:rPr>
+              <a:t>2400Hz</a:t>
+            </a:r>
+            <a:endParaRPr lang="en-US" dirty="0">
+              <a:solidFill>
+                <a:srgbClr val="FF0000"/>
+              </a:solidFill>
+            </a:endParaRPr>
           </a:p>
         </p:txBody>
       </p:sp>
     </p:spTree>
     <p:extLst>
       <p:ext uri="{BB962C8B-B14F-4D97-AF65-F5344CB8AC3E}">
-        <p14:creationId xmlns:p14="http://schemas.microsoft.com/office/powerpoint/2010/main" val="320723473"/>
+        <p14:creationId xmlns:p14="http://schemas.microsoft.com/office/powerpoint/2010/main" val="1620821836"/>
       </p:ext>
     </p:extLst>
   </p:cSld>
   <p:clrMapOvr>
     <a:masterClrMapping/>
   </p:clrMapOvr>
+  <p:timing>
+    <p:tnLst>
+      <p:par>
+        <p:cTn id="1" dur="indefinite" restart="never" nodeType="tmRoot"/>
+      </p:par>
+    </p:tnLst>
+  </p:timing>
 </p:sld>
 </file>
 

</xml_diff>

<commit_message>
added upsample and downsample
</commit_message>
<xml_diff>
--- a/docs/presentation.pptx
+++ b/docs/presentation.pptx
@@ -3737,10 +3737,52 @@
               <a:rPr lang="en-US" dirty="0" err="1" smtClean="0"/>
               <a:t>Gzip</a:t>
             </a:r>
+            <a:r>
+              <a:rPr lang="en-US" dirty="0" smtClean="0"/>
+              <a:t> – LZ77 and Huffman Encoding</a:t>
+            </a:r>
+          </a:p>
+          <a:p>
+            <a:r>
+              <a:rPr lang="en-US" dirty="0" smtClean="0"/>
+              <a:t>Python </a:t>
+            </a:r>
+            <a:r>
+              <a:rPr lang="en-US" dirty="0" err="1" smtClean="0"/>
+              <a:t>gzip</a:t>
+            </a:r>
+            <a:r>
+              <a:rPr lang="en-US" dirty="0" smtClean="0"/>
+              <a:t> library</a:t>
+            </a:r>
             <a:endParaRPr lang="en-US" dirty="0"/>
           </a:p>
         </p:txBody>
       </p:sp>
+      <p:pic>
+        <p:nvPicPr>
+          <p:cNvPr id="4" name="Picture 3"/>
+          <p:cNvPicPr>
+            <a:picLocks noChangeAspect="1"/>
+          </p:cNvPicPr>
+          <p:nvPr/>
+        </p:nvPicPr>
+        <p:blipFill>
+          <a:blip r:embed="rId2"/>
+          <a:stretch>
+            <a:fillRect/>
+          </a:stretch>
+        </p:blipFill>
+        <p:spPr>
+          <a:xfrm>
+            <a:off x="3898900" y="3006725"/>
+            <a:ext cx="3797300" cy="2514600"/>
+          </a:xfrm>
+          <a:prstGeom prst="rect">
+            <a:avLst/>
+          </a:prstGeom>
+        </p:spPr>
+      </p:pic>
     </p:spTree>
     <p:extLst>
       <p:ext uri="{BB962C8B-B14F-4D97-AF65-F5344CB8AC3E}">
@@ -3816,10 +3858,44 @@
           <a:bodyPr/>
           <a:lstStyle/>
           <a:p>
-            <a:endParaRPr lang="en-US"/>
-          </a:p>
-        </p:txBody>
-      </p:sp>
+            <a:r>
+              <a:rPr lang="en-US" dirty="0" smtClean="0"/>
+              <a:t>Used standard AX.25 packets</a:t>
+            </a:r>
+          </a:p>
+          <a:p>
+            <a:r>
+              <a:rPr lang="en-US" dirty="0" smtClean="0"/>
+              <a:t>5 pre and post-flags</a:t>
+            </a:r>
+            <a:endParaRPr lang="en-US" dirty="0" smtClean="0"/>
+          </a:p>
+        </p:txBody>
+      </p:sp>
+      <p:pic>
+        <p:nvPicPr>
+          <p:cNvPr id="5" name="Picture 4"/>
+          <p:cNvPicPr>
+            <a:picLocks noChangeAspect="1"/>
+          </p:cNvPicPr>
+          <p:nvPr/>
+        </p:nvPicPr>
+        <p:blipFill>
+          <a:blip r:embed="rId2"/>
+          <a:stretch>
+            <a:fillRect/>
+          </a:stretch>
+        </p:blipFill>
+        <p:spPr>
+          <a:xfrm>
+            <a:off x="1790700" y="2889250"/>
+            <a:ext cx="8610600" cy="1003300"/>
+          </a:xfrm>
+          <a:prstGeom prst="rect">
+            <a:avLst/>
+          </a:prstGeom>
+        </p:spPr>
+      </p:pic>
     </p:spTree>
     <p:extLst>
       <p:ext uri="{BB962C8B-B14F-4D97-AF65-F5344CB8AC3E}">
@@ -3895,7 +3971,11 @@
           <a:bodyPr/>
           <a:lstStyle/>
           <a:p>
-            <a:endParaRPr lang="en-US"/>
+            <a:r>
+              <a:rPr lang="en-US" dirty="0" smtClean="0"/>
+              <a:t># packet in field of packet. If receiver doesn’t receive one, it asks for a retransmission and the sender puts that number packet on its queue</a:t>
+            </a:r>
+            <a:endParaRPr lang="en-US" dirty="0"/>
           </a:p>
         </p:txBody>
       </p:sp>
@@ -4012,20 +4092,20 @@
               <a:t>Went with </a:t>
             </a:r>
             <a:r>
-              <a:rPr lang="en-US" dirty="0" err="1" smtClean="0"/>
-              <a:t>mark_f</a:t>
-            </a:r>
-            <a:r>
               <a:rPr lang="en-US" dirty="0" smtClean="0"/>
-              <a:t> = 1200 HZ, </a:t>
-            </a:r>
-            <a:r>
-              <a:rPr lang="en-US" dirty="0" err="1" smtClean="0"/>
-              <a:t>space_f</a:t>
+              <a:t>mark </a:t>
             </a:r>
             <a:r>
               <a:rPr lang="en-US" dirty="0" smtClean="0"/>
-              <a:t> = 2400 Hz and baud rate = 2400</a:t>
+              <a:t>= 1200 HZ, </a:t>
+            </a:r>
+            <a:r>
+              <a:rPr lang="en-US" dirty="0" smtClean="0"/>
+              <a:t>space </a:t>
+            </a:r>
+            <a:r>
+              <a:rPr lang="en-US" dirty="0" smtClean="0"/>
+              <a:t>= 2400 Hz and baud rate = 2400</a:t>
             </a:r>
           </a:p>
           <a:p>
@@ -4325,44 +4405,6 @@
           <a:chExt cx="0" cy="0"/>
         </a:xfrm>
       </p:grpSpPr>
-      <p:sp>
-        <p:nvSpPr>
-          <p:cNvPr id="2" name="Title 1"/>
-          <p:cNvSpPr>
-            <a:spLocks noGrp="1"/>
-          </p:cNvSpPr>
-          <p:nvPr>
-            <p:ph type="title"/>
-          </p:nvPr>
-        </p:nvSpPr>
-        <p:spPr/>
-        <p:txBody>
-          <a:bodyPr/>
-          <a:lstStyle/>
-          <a:p>
-            <a:endParaRPr lang="en-US"/>
-          </a:p>
-        </p:txBody>
-      </p:sp>
-      <p:sp>
-        <p:nvSpPr>
-          <p:cNvPr id="3" name="Content Placeholder 2"/>
-          <p:cNvSpPr>
-            <a:spLocks noGrp="1"/>
-          </p:cNvSpPr>
-          <p:nvPr>
-            <p:ph idx="1"/>
-          </p:nvPr>
-        </p:nvSpPr>
-        <p:spPr/>
-        <p:txBody>
-          <a:bodyPr/>
-          <a:lstStyle/>
-          <a:p>
-            <a:endParaRPr lang="en-US"/>
-          </a:p>
-        </p:txBody>
-      </p:sp>
       <p:pic>
         <p:nvPicPr>
           <p:cNvPr id="4" name="Picture 3"/>
@@ -4379,7 +4421,7 @@
         </p:blipFill>
         <p:spPr>
           <a:xfrm>
-            <a:off x="2133600" y="1825625"/>
+            <a:off x="2349500" y="1190625"/>
             <a:ext cx="7372350" cy="2064566"/>
           </a:xfrm>
           <a:prstGeom prst="rect">
@@ -4403,7 +4445,7 @@
         </p:blipFill>
         <p:spPr>
           <a:xfrm>
-            <a:off x="2286000" y="3921964"/>
+            <a:off x="2225675" y="3440928"/>
             <a:ext cx="7620000" cy="2307409"/>
           </a:xfrm>
           <a:prstGeom prst="rect">

</xml_diff>

<commit_message>
merge working transmission to master
</commit_message>
<xml_diff>
--- a/docs/presentation.pptx
+++ b/docs/presentation.pptx
@@ -3737,10 +3737,52 @@
               <a:rPr lang="en-US" dirty="0" err="1" smtClean="0"/>
               <a:t>Gzip</a:t>
             </a:r>
+            <a:r>
+              <a:rPr lang="en-US" dirty="0" smtClean="0"/>
+              <a:t> – LZ77 and Huffman Encoding</a:t>
+            </a:r>
+          </a:p>
+          <a:p>
+            <a:r>
+              <a:rPr lang="en-US" dirty="0" smtClean="0"/>
+              <a:t>Python </a:t>
+            </a:r>
+            <a:r>
+              <a:rPr lang="en-US" dirty="0" err="1" smtClean="0"/>
+              <a:t>gzip</a:t>
+            </a:r>
+            <a:r>
+              <a:rPr lang="en-US" dirty="0" smtClean="0"/>
+              <a:t> library</a:t>
+            </a:r>
             <a:endParaRPr lang="en-US" dirty="0"/>
           </a:p>
         </p:txBody>
       </p:sp>
+      <p:pic>
+        <p:nvPicPr>
+          <p:cNvPr id="4" name="Picture 3"/>
+          <p:cNvPicPr>
+            <a:picLocks noChangeAspect="1"/>
+          </p:cNvPicPr>
+          <p:nvPr/>
+        </p:nvPicPr>
+        <p:blipFill>
+          <a:blip r:embed="rId2"/>
+          <a:stretch>
+            <a:fillRect/>
+          </a:stretch>
+        </p:blipFill>
+        <p:spPr>
+          <a:xfrm>
+            <a:off x="3898900" y="3006725"/>
+            <a:ext cx="3797300" cy="2514600"/>
+          </a:xfrm>
+          <a:prstGeom prst="rect">
+            <a:avLst/>
+          </a:prstGeom>
+        </p:spPr>
+      </p:pic>
     </p:spTree>
     <p:extLst>
       <p:ext uri="{BB962C8B-B14F-4D97-AF65-F5344CB8AC3E}">
@@ -3816,10 +3858,44 @@
           <a:bodyPr/>
           <a:lstStyle/>
           <a:p>
-            <a:endParaRPr lang="en-US"/>
-          </a:p>
-        </p:txBody>
-      </p:sp>
+            <a:r>
+              <a:rPr lang="en-US" dirty="0" smtClean="0"/>
+              <a:t>Used standard AX.25 packets</a:t>
+            </a:r>
+          </a:p>
+          <a:p>
+            <a:r>
+              <a:rPr lang="en-US" dirty="0" smtClean="0"/>
+              <a:t>5 pre and post-flags</a:t>
+            </a:r>
+            <a:endParaRPr lang="en-US" dirty="0" smtClean="0"/>
+          </a:p>
+        </p:txBody>
+      </p:sp>
+      <p:pic>
+        <p:nvPicPr>
+          <p:cNvPr id="5" name="Picture 4"/>
+          <p:cNvPicPr>
+            <a:picLocks noChangeAspect="1"/>
+          </p:cNvPicPr>
+          <p:nvPr/>
+        </p:nvPicPr>
+        <p:blipFill>
+          <a:blip r:embed="rId2"/>
+          <a:stretch>
+            <a:fillRect/>
+          </a:stretch>
+        </p:blipFill>
+        <p:spPr>
+          <a:xfrm>
+            <a:off x="1790700" y="2889250"/>
+            <a:ext cx="8610600" cy="1003300"/>
+          </a:xfrm>
+          <a:prstGeom prst="rect">
+            <a:avLst/>
+          </a:prstGeom>
+        </p:spPr>
+      </p:pic>
     </p:spTree>
     <p:extLst>
       <p:ext uri="{BB962C8B-B14F-4D97-AF65-F5344CB8AC3E}">
@@ -3895,7 +3971,11 @@
           <a:bodyPr/>
           <a:lstStyle/>
           <a:p>
-            <a:endParaRPr lang="en-US"/>
+            <a:r>
+              <a:rPr lang="en-US" dirty="0" smtClean="0"/>
+              <a:t># packet in field of packet. If receiver doesn’t receive one, it asks for a retransmission and the sender puts that number packet on its queue</a:t>
+            </a:r>
+            <a:endParaRPr lang="en-US" dirty="0"/>
           </a:p>
         </p:txBody>
       </p:sp>
@@ -4012,20 +4092,20 @@
               <a:t>Went with </a:t>
             </a:r>
             <a:r>
-              <a:rPr lang="en-US" dirty="0" err="1" smtClean="0"/>
-              <a:t>mark_f</a:t>
-            </a:r>
-            <a:r>
               <a:rPr lang="en-US" dirty="0" smtClean="0"/>
-              <a:t> = 1200 HZ, </a:t>
-            </a:r>
-            <a:r>
-              <a:rPr lang="en-US" dirty="0" err="1" smtClean="0"/>
-              <a:t>space_f</a:t>
+              <a:t>mark </a:t>
             </a:r>
             <a:r>
               <a:rPr lang="en-US" dirty="0" smtClean="0"/>
-              <a:t> = 2400 Hz and baud rate = 2400</a:t>
+              <a:t>= 1200 HZ, </a:t>
+            </a:r>
+            <a:r>
+              <a:rPr lang="en-US" dirty="0" smtClean="0"/>
+              <a:t>space </a:t>
+            </a:r>
+            <a:r>
+              <a:rPr lang="en-US" dirty="0" smtClean="0"/>
+              <a:t>= 2400 Hz and baud rate = 2400</a:t>
             </a:r>
           </a:p>
           <a:p>
@@ -4325,44 +4405,6 @@
           <a:chExt cx="0" cy="0"/>
         </a:xfrm>
       </p:grpSpPr>
-      <p:sp>
-        <p:nvSpPr>
-          <p:cNvPr id="2" name="Title 1"/>
-          <p:cNvSpPr>
-            <a:spLocks noGrp="1"/>
-          </p:cNvSpPr>
-          <p:nvPr>
-            <p:ph type="title"/>
-          </p:nvPr>
-        </p:nvSpPr>
-        <p:spPr/>
-        <p:txBody>
-          <a:bodyPr/>
-          <a:lstStyle/>
-          <a:p>
-            <a:endParaRPr lang="en-US"/>
-          </a:p>
-        </p:txBody>
-      </p:sp>
-      <p:sp>
-        <p:nvSpPr>
-          <p:cNvPr id="3" name="Content Placeholder 2"/>
-          <p:cNvSpPr>
-            <a:spLocks noGrp="1"/>
-          </p:cNvSpPr>
-          <p:nvPr>
-            <p:ph idx="1"/>
-          </p:nvPr>
-        </p:nvSpPr>
-        <p:spPr/>
-        <p:txBody>
-          <a:bodyPr/>
-          <a:lstStyle/>
-          <a:p>
-            <a:endParaRPr lang="en-US"/>
-          </a:p>
-        </p:txBody>
-      </p:sp>
       <p:pic>
         <p:nvPicPr>
           <p:cNvPr id="4" name="Picture 3"/>
@@ -4379,7 +4421,7 @@
         </p:blipFill>
         <p:spPr>
           <a:xfrm>
-            <a:off x="2133600" y="1825625"/>
+            <a:off x="2349500" y="1190625"/>
             <a:ext cx="7372350" cy="2064566"/>
           </a:xfrm>
           <a:prstGeom prst="rect">
@@ -4403,7 +4445,7 @@
         </p:blipFill>
         <p:spPr>
           <a:xfrm>
-            <a:off x="2286000" y="3921964"/>
+            <a:off x="2225675" y="3440928"/>
             <a:ext cx="7620000" cy="2307409"/>
           </a:xfrm>
           <a:prstGeom prst="rect">

</xml_diff>